<commit_message>
Apresentação - bkp; Notebook - rodei com kernel_size (ks) = 4
</commit_message>
<xml_diff>
--- a/Trabalho Final - Daniel da Silva Costa/Trabalho Final - Daniel da Silva Costa.pptx
+++ b/Trabalho Final - Daniel da Silva Costa/Trabalho Final - Daniel da Silva Costa.pptx
@@ -2,30 +2,39 @@
 <file path=ppt/presentation.xml><?xml version="1.0" encoding="utf-8"?>
 <p:presentation xmlns:a="http://schemas.openxmlformats.org/drawingml/2006/main" xmlns:r="http://schemas.openxmlformats.org/officeDocument/2006/relationships" xmlns:mc="http://schemas.openxmlformats.org/markup-compatibility/2006" xmlns:mv="urn:schemas-microsoft-com:mac:vml" xmlns:p="http://schemas.openxmlformats.org/presentationml/2006/main" xmlns:c="http://schemas.openxmlformats.org/drawingml/2006/chart" xmlns:dgm="http://schemas.openxmlformats.org/drawingml/2006/diagram" xmlns:o="urn:schemas-microsoft-com:office:office" xmlns:v="urn:schemas-microsoft-com:vml" xmlns:pvml="urn:schemas-microsoft-com:office:powerpoint" xmlns:com="http://schemas.openxmlformats.org/drawingml/2006/compatibility" xmlns:p14="http://schemas.microsoft.com/office/powerpoint/2010/main" xmlns:p15="http://schemas.microsoft.com/office/powerpoint/2012/main" xmlns:ahyp="http://schemas.microsoft.com/office/drawing/2018/hyperlinkcolor" autoCompressPictures="0" embedTrueTypeFonts="1" strictFirstAndLastChars="0" saveSubsetFonts="1">
   <p:sldMasterIdLst>
-    <p:sldMasterId id="2147483659" r:id="rId4"/>
+    <p:sldMasterId id="2147483659" r:id="rId5"/>
   </p:sldMasterIdLst>
   <p:notesMasterIdLst>
-    <p:notesMasterId r:id="rId5"/>
+    <p:notesMasterId r:id="rId6"/>
   </p:notesMasterIdLst>
   <p:sldIdLst>
-    <p:sldId id="256" r:id="rId6"/>
-    <p:sldId id="257" r:id="rId7"/>
-    <p:sldId id="258" r:id="rId8"/>
-    <p:sldId id="259" r:id="rId9"/>
-    <p:sldId id="260" r:id="rId10"/>
-    <p:sldId id="261" r:id="rId11"/>
-    <p:sldId id="262" r:id="rId12"/>
-    <p:sldId id="263" r:id="rId13"/>
+    <p:sldId id="256" r:id="rId7"/>
+    <p:sldId id="257" r:id="rId8"/>
+    <p:sldId id="258" r:id="rId9"/>
+    <p:sldId id="259" r:id="rId10"/>
+    <p:sldId id="260" r:id="rId11"/>
+    <p:sldId id="261" r:id="rId12"/>
+    <p:sldId id="262" r:id="rId13"/>
+    <p:sldId id="263" r:id="rId14"/>
+    <p:sldId id="264" r:id="rId15"/>
+    <p:sldId id="265" r:id="rId16"/>
+    <p:sldId id="266" r:id="rId17"/>
+    <p:sldId id="267" r:id="rId18"/>
+    <p:sldId id="268" r:id="rId19"/>
+    <p:sldId id="269" r:id="rId20"/>
+    <p:sldId id="270" r:id="rId21"/>
+    <p:sldId id="271" r:id="rId22"/>
+    <p:sldId id="272" r:id="rId23"/>
   </p:sldIdLst>
   <p:sldSz cy="5143500" cx="9144000"/>
   <p:notesSz cx="6858000" cy="9144000"/>
   <p:embeddedFontLst>
     <p:embeddedFont>
       <p:font typeface="Roboto"/>
-      <p:regular r:id="rId14"/>
-      <p:bold r:id="rId15"/>
-      <p:italic r:id="rId16"/>
-      <p:boldItalic r:id="rId17"/>
+      <p:regular r:id="rId24"/>
+      <p:bold r:id="rId25"/>
+      <p:italic r:id="rId26"/>
+      <p:boldItalic r:id="rId27"/>
     </p:embeddedFont>
   </p:embeddedFontLst>
   <p:defaultTextStyle>
@@ -274,6 +283,69 @@
     </p:ext>
   </p:extLst>
 </p:presentation>
+</file>
+
+<file path=ppt/commentAuthors.xml><?xml version="1.0" encoding="utf-8"?>
+<p:cmAuthorLst xmlns:a="http://schemas.openxmlformats.org/drawingml/2006/main" xmlns:r="http://schemas.openxmlformats.org/officeDocument/2006/relationships" xmlns:mc="http://schemas.openxmlformats.org/markup-compatibility/2006" xmlns:mv="urn:schemas-microsoft-com:mac:vml" xmlns:p="http://schemas.openxmlformats.org/presentationml/2006/main" xmlns:c="http://schemas.openxmlformats.org/drawingml/2006/chart" xmlns:dgm="http://schemas.openxmlformats.org/drawingml/2006/diagram" xmlns:o="urn:schemas-microsoft-com:office:office" xmlns:v="urn:schemas-microsoft-com:vml" xmlns:pvml="urn:schemas-microsoft-com:office:powerpoint" xmlns:com="http://schemas.openxmlformats.org/drawingml/2006/compatibility" xmlns:p14="http://schemas.microsoft.com/office/powerpoint/2010/main" xmlns:p15="http://schemas.microsoft.com/office/powerpoint/2012/main" xmlns:ahyp="http://schemas.microsoft.com/office/drawing/2018/hyperlinkcolor">
+  <p:cmAuthor clrIdx="0" id="0" initials="" lastIdx="9" name="Daniel da Silva Costa"/>
+</p:cmAuthorLst>
+</file>
+
+<file path=ppt/comments/comment1.xml><?xml version="1.0" encoding="utf-8"?>
+<p:cmLst xmlns:a="http://schemas.openxmlformats.org/drawingml/2006/main" xmlns:r="http://schemas.openxmlformats.org/officeDocument/2006/relationships" xmlns:mc="http://schemas.openxmlformats.org/markup-compatibility/2006" xmlns:mv="urn:schemas-microsoft-com:mac:vml" xmlns:p="http://schemas.openxmlformats.org/presentationml/2006/main" xmlns:c="http://schemas.openxmlformats.org/drawingml/2006/chart" xmlns:dgm="http://schemas.openxmlformats.org/drawingml/2006/diagram" xmlns:o="urn:schemas-microsoft-com:office:office" xmlns:v="urn:schemas-microsoft-com:vml" xmlns:pvml="urn:schemas-microsoft-com:office:powerpoint" xmlns:com="http://schemas.openxmlformats.org/drawingml/2006/compatibility" xmlns:p14="http://schemas.microsoft.com/office/powerpoint/2010/main" xmlns:p15="http://schemas.microsoft.com/office/powerpoint/2012/main" xmlns:ahyp="http://schemas.microsoft.com/office/drawing/2018/hyperlinkcolor">
+  <p:cm authorId="0" idx="1" dt="2022-12-09T01:31:01.301">
+    <p:pos x="297" y="1208"/>
+    <p:text>Rever o conceito geral de cada uma.</p:text>
+  </p:cm>
+  <p:cm authorId="0" idx="2" dt="2022-12-09T01:43:10.342">
+    <p:pos x="297" y="1308"/>
+    <p:text>Destacar alguns subitens importantes aqui embaixo.</p:text>
+  </p:cm>
+</p:cmLst>
+</file>
+
+<file path=ppt/comments/comment2.xml><?xml version="1.0" encoding="utf-8"?>
+<p:cmLst xmlns:a="http://schemas.openxmlformats.org/drawingml/2006/main" xmlns:r="http://schemas.openxmlformats.org/officeDocument/2006/relationships" xmlns:mc="http://schemas.openxmlformats.org/markup-compatibility/2006" xmlns:mv="urn:schemas-microsoft-com:mac:vml" xmlns:p="http://schemas.openxmlformats.org/presentationml/2006/main" xmlns:c="http://schemas.openxmlformats.org/drawingml/2006/chart" xmlns:dgm="http://schemas.openxmlformats.org/drawingml/2006/diagram" xmlns:o="urn:schemas-microsoft-com:office:office" xmlns:v="urn:schemas-microsoft-com:vml" xmlns:pvml="urn:schemas-microsoft-com:office:powerpoint" xmlns:com="http://schemas.openxmlformats.org/drawingml/2006/compatibility" xmlns:p14="http://schemas.microsoft.com/office/powerpoint/2010/main" xmlns:p15="http://schemas.microsoft.com/office/powerpoint/2012/main" xmlns:ahyp="http://schemas.microsoft.com/office/drawing/2018/hyperlinkcolor">
+  <p:cm authorId="0" idx="3" dt="2022-12-09T02:10:31.936">
+    <p:pos x="297" y="465"/>
+    <p:text>Colocar o summary do modelo.</p:text>
+  </p:cm>
+  <p:cm authorId="0" idx="4" dt="2022-12-09T02:10:15.807">
+    <p:pos x="297" y="565"/>
+    <p:text>Lembrar de indicar o Dropout de .2.</p:text>
+  </p:cm>
+</p:cmLst>
+</file>
+
+<file path=ppt/comments/comment3.xml><?xml version="1.0" encoding="utf-8"?>
+<p:cmLst xmlns:a="http://schemas.openxmlformats.org/drawingml/2006/main" xmlns:r="http://schemas.openxmlformats.org/officeDocument/2006/relationships" xmlns:mc="http://schemas.openxmlformats.org/markup-compatibility/2006" xmlns:mv="urn:schemas-microsoft-com:mac:vml" xmlns:p="http://schemas.openxmlformats.org/presentationml/2006/main" xmlns:c="http://schemas.openxmlformats.org/drawingml/2006/chart" xmlns:dgm="http://schemas.openxmlformats.org/drawingml/2006/diagram" xmlns:o="urn:schemas-microsoft-com:office:office" xmlns:v="urn:schemas-microsoft-com:vml" xmlns:pvml="urn:schemas-microsoft-com:office:powerpoint" xmlns:com="http://schemas.openxmlformats.org/drawingml/2006/compatibility" xmlns:p14="http://schemas.microsoft.com/office/powerpoint/2010/main" xmlns:p15="http://schemas.microsoft.com/office/powerpoint/2012/main" xmlns:ahyp="http://schemas.microsoft.com/office/drawing/2018/hyperlinkcolor">
+  <p:cm authorId="0" idx="5" dt="2022-12-09T02:09:35.331">
+    <p:pos x="297" y="1208"/>
+    <p:text>Explicar porque testei a variação de kernel size.
+- Colocar a indicação do trabalho de visualiação das camadas da rede usando deconvolução que obteve um resultado melhor quando alterou o kernel size e mais alguma coisa...</p:text>
+  </p:cm>
+  <p:cm authorId="0" idx="6" dt="2022-12-09T01:43:46.623">
+    <p:pos x="297" y="1308"/>
+    <p:text>Explicar e colocar informações importantes sobre o dataset.</p:text>
+  </p:cm>
+</p:cmLst>
+</file>
+
+<file path=ppt/comments/comment4.xml><?xml version="1.0" encoding="utf-8"?>
+<p:cmLst xmlns:a="http://schemas.openxmlformats.org/drawingml/2006/main" xmlns:r="http://schemas.openxmlformats.org/officeDocument/2006/relationships" xmlns:mc="http://schemas.openxmlformats.org/markup-compatibility/2006" xmlns:mv="urn:schemas-microsoft-com:mac:vml" xmlns:p="http://schemas.openxmlformats.org/presentationml/2006/main" xmlns:c="http://schemas.openxmlformats.org/drawingml/2006/chart" xmlns:dgm="http://schemas.openxmlformats.org/drawingml/2006/diagram" xmlns:o="urn:schemas-microsoft-com:office:office" xmlns:v="urn:schemas-microsoft-com:vml" xmlns:pvml="urn:schemas-microsoft-com:office:powerpoint" xmlns:com="http://schemas.openxmlformats.org/drawingml/2006/compatibility" xmlns:p14="http://schemas.microsoft.com/office/powerpoint/2010/main" xmlns:p15="http://schemas.microsoft.com/office/powerpoint/2012/main" xmlns:ahyp="http://schemas.microsoft.com/office/drawing/2018/hyperlinkcolor">
+  <p:cm authorId="0" idx="7" dt="2022-12-09T01:50:35.636">
+    <p:pos x="290" y="1301"/>
+    <p:text>Colocar imagens de outras classes usando o melhor modelo.</p:text>
+  </p:cm>
+  <p:cm authorId="0" idx="8" dt="2022-12-09T01:50:40.193">
+    <p:pos x="290" y="1401"/>
+    <p:text>Indicar a acurácia alcançada no melhor modelo.</p:text>
+  </p:cm>
+  <p:cm authorId="0" idx="9" dt="2022-12-09T01:48:46.096">
+    <p:pos x="290" y="1501"/>
+    <p:text>Indicar o kernel usado no melhor modelo.</p:text>
+  </p:cm>
+</p:cmLst>
 </file>
 
 <file path=ppt/notesMasters/notesMaster1.xml><?xml version="1.0" encoding="utf-8"?>
@@ -801,6 +873,798 @@
 </p:notes>
 </file>
 
+<file path=ppt/notesSlides/notesSlide10.xml><?xml version="1.0" encoding="utf-8"?>
+<p:notes xmlns:a="http://schemas.openxmlformats.org/drawingml/2006/main" xmlns:r="http://schemas.openxmlformats.org/officeDocument/2006/relationships" xmlns:mc="http://schemas.openxmlformats.org/markup-compatibility/2006" xmlns:mv="urn:schemas-microsoft-com:mac:vml" xmlns:p="http://schemas.openxmlformats.org/presentationml/2006/main" xmlns:c="http://schemas.openxmlformats.org/drawingml/2006/chart" xmlns:dgm="http://schemas.openxmlformats.org/drawingml/2006/diagram" xmlns:o="urn:schemas-microsoft-com:office:office" xmlns:v="urn:schemas-microsoft-com:vml" xmlns:pvml="urn:schemas-microsoft-com:office:powerpoint" xmlns:com="http://schemas.openxmlformats.org/drawingml/2006/compatibility" xmlns:p14="http://schemas.microsoft.com/office/powerpoint/2010/main" xmlns:p15="http://schemas.microsoft.com/office/powerpoint/2012/main" xmlns:ahyp="http://schemas.microsoft.com/office/drawing/2018/hyperlinkcolor" showMasterPhAnim="0" showMasterSp="0">
+  <p:cSld>
+    <p:spTree>
+      <p:nvGrpSpPr>
+        <p:cNvPr id="116" name="Shape 116"/>
+        <p:cNvGrpSpPr/>
+        <p:nvPr/>
+      </p:nvGrpSpPr>
+      <p:grpSpPr>
+        <a:xfrm>
+          <a:off x="0" y="0"/>
+          <a:ext cx="0" cy="0"/>
+          <a:chOff x="0" y="0"/>
+          <a:chExt cx="0" cy="0"/>
+        </a:xfrm>
+      </p:grpSpPr>
+      <p:sp>
+        <p:nvSpPr>
+          <p:cNvPr id="117" name="Google Shape;117;g1aea58decbe_0_9:notes"/>
+          <p:cNvSpPr/>
+          <p:nvPr>
+            <p:ph idx="2" type="sldImg"/>
+          </p:nvPr>
+        </p:nvSpPr>
+        <p:spPr>
+          <a:xfrm>
+            <a:off x="381300" y="685800"/>
+            <a:ext cx="6096000" cy="3429000"/>
+          </a:xfrm>
+          <a:custGeom>
+            <a:rect b="b" l="l" r="r" t="t"/>
+            <a:pathLst>
+              <a:path extrusionOk="0" h="120000" w="120000">
+                <a:moveTo>
+                  <a:pt x="0" y="0"/>
+                </a:moveTo>
+                <a:lnTo>
+                  <a:pt x="120000" y="0"/>
+                </a:lnTo>
+                <a:lnTo>
+                  <a:pt x="120000" y="120000"/>
+                </a:lnTo>
+                <a:lnTo>
+                  <a:pt x="0" y="120000"/>
+                </a:lnTo>
+                <a:close/>
+              </a:path>
+            </a:pathLst>
+          </a:custGeom>
+        </p:spPr>
+      </p:sp>
+      <p:sp>
+        <p:nvSpPr>
+          <p:cNvPr id="118" name="Google Shape;118;g1aea58decbe_0_9:notes"/>
+          <p:cNvSpPr txBox="1"/>
+          <p:nvPr>
+            <p:ph idx="1" type="body"/>
+          </p:nvPr>
+        </p:nvSpPr>
+        <p:spPr>
+          <a:xfrm>
+            <a:off x="685800" y="4343400"/>
+            <a:ext cx="5486400" cy="4114800"/>
+          </a:xfrm>
+          <a:prstGeom prst="rect">
+            <a:avLst/>
+          </a:prstGeom>
+        </p:spPr>
+        <p:txBody>
+          <a:bodyPr anchorCtr="0" anchor="t" bIns="91425" lIns="91425" spcFirstLastPara="1" rIns="91425" wrap="square" tIns="91425">
+            <a:noAutofit/>
+          </a:bodyPr>
+          <a:lstStyle/>
+          <a:p>
+            <a:pPr indent="0" lvl="0" marL="0" rtl="0" algn="l">
+              <a:spcBef>
+                <a:spcPts val="0"/>
+              </a:spcBef>
+              <a:spcAft>
+                <a:spcPts val="0"/>
+              </a:spcAft>
+              <a:buNone/>
+            </a:pPr>
+            <a:r>
+              <a:t/>
+            </a:r>
+            <a:endParaRPr/>
+          </a:p>
+        </p:txBody>
+      </p:sp>
+    </p:spTree>
+  </p:cSld>
+  <p:clrMapOvr>
+    <a:masterClrMapping/>
+  </p:clrMapOvr>
+</p:notes>
+</file>
+
+<file path=ppt/notesSlides/notesSlide11.xml><?xml version="1.0" encoding="utf-8"?>
+<p:notes xmlns:a="http://schemas.openxmlformats.org/drawingml/2006/main" xmlns:r="http://schemas.openxmlformats.org/officeDocument/2006/relationships" xmlns:mc="http://schemas.openxmlformats.org/markup-compatibility/2006" xmlns:mv="urn:schemas-microsoft-com:mac:vml" xmlns:p="http://schemas.openxmlformats.org/presentationml/2006/main" xmlns:c="http://schemas.openxmlformats.org/drawingml/2006/chart" xmlns:dgm="http://schemas.openxmlformats.org/drawingml/2006/diagram" xmlns:o="urn:schemas-microsoft-com:office:office" xmlns:v="urn:schemas-microsoft-com:vml" xmlns:pvml="urn:schemas-microsoft-com:office:powerpoint" xmlns:com="http://schemas.openxmlformats.org/drawingml/2006/compatibility" xmlns:p14="http://schemas.microsoft.com/office/powerpoint/2010/main" xmlns:p15="http://schemas.microsoft.com/office/powerpoint/2012/main" xmlns:ahyp="http://schemas.microsoft.com/office/drawing/2018/hyperlinkcolor" showMasterPhAnim="0" showMasterSp="0">
+  <p:cSld>
+    <p:spTree>
+      <p:nvGrpSpPr>
+        <p:cNvPr id="121" name="Shape 121"/>
+        <p:cNvGrpSpPr/>
+        <p:nvPr/>
+      </p:nvGrpSpPr>
+      <p:grpSpPr>
+        <a:xfrm>
+          <a:off x="0" y="0"/>
+          <a:ext cx="0" cy="0"/>
+          <a:chOff x="0" y="0"/>
+          <a:chExt cx="0" cy="0"/>
+        </a:xfrm>
+      </p:grpSpPr>
+      <p:sp>
+        <p:nvSpPr>
+          <p:cNvPr id="122" name="Google Shape;122;g1aea58decbe_0_16:notes"/>
+          <p:cNvSpPr/>
+          <p:nvPr>
+            <p:ph idx="2" type="sldImg"/>
+          </p:nvPr>
+        </p:nvSpPr>
+        <p:spPr>
+          <a:xfrm>
+            <a:off x="381300" y="685800"/>
+            <a:ext cx="6096000" cy="3429000"/>
+          </a:xfrm>
+          <a:custGeom>
+            <a:rect b="b" l="l" r="r" t="t"/>
+            <a:pathLst>
+              <a:path extrusionOk="0" h="120000" w="120000">
+                <a:moveTo>
+                  <a:pt x="0" y="0"/>
+                </a:moveTo>
+                <a:lnTo>
+                  <a:pt x="120000" y="0"/>
+                </a:lnTo>
+                <a:lnTo>
+                  <a:pt x="120000" y="120000"/>
+                </a:lnTo>
+                <a:lnTo>
+                  <a:pt x="0" y="120000"/>
+                </a:lnTo>
+                <a:close/>
+              </a:path>
+            </a:pathLst>
+          </a:custGeom>
+        </p:spPr>
+      </p:sp>
+      <p:sp>
+        <p:nvSpPr>
+          <p:cNvPr id="123" name="Google Shape;123;g1aea58decbe_0_16:notes"/>
+          <p:cNvSpPr txBox="1"/>
+          <p:nvPr>
+            <p:ph idx="1" type="body"/>
+          </p:nvPr>
+        </p:nvSpPr>
+        <p:spPr>
+          <a:xfrm>
+            <a:off x="685800" y="4343400"/>
+            <a:ext cx="5486400" cy="4114800"/>
+          </a:xfrm>
+          <a:prstGeom prst="rect">
+            <a:avLst/>
+          </a:prstGeom>
+        </p:spPr>
+        <p:txBody>
+          <a:bodyPr anchorCtr="0" anchor="t" bIns="91425" lIns="91425" spcFirstLastPara="1" rIns="91425" wrap="square" tIns="91425">
+            <a:noAutofit/>
+          </a:bodyPr>
+          <a:lstStyle/>
+          <a:p>
+            <a:pPr indent="0" lvl="0" marL="0" rtl="0" algn="l">
+              <a:spcBef>
+                <a:spcPts val="0"/>
+              </a:spcBef>
+              <a:spcAft>
+                <a:spcPts val="0"/>
+              </a:spcAft>
+              <a:buNone/>
+            </a:pPr>
+            <a:r>
+              <a:t/>
+            </a:r>
+            <a:endParaRPr/>
+          </a:p>
+        </p:txBody>
+      </p:sp>
+    </p:spTree>
+  </p:cSld>
+  <p:clrMapOvr>
+    <a:masterClrMapping/>
+  </p:clrMapOvr>
+</p:notes>
+</file>
+
+<file path=ppt/notesSlides/notesSlide12.xml><?xml version="1.0" encoding="utf-8"?>
+<p:notes xmlns:a="http://schemas.openxmlformats.org/drawingml/2006/main" xmlns:r="http://schemas.openxmlformats.org/officeDocument/2006/relationships" xmlns:mc="http://schemas.openxmlformats.org/markup-compatibility/2006" xmlns:mv="urn:schemas-microsoft-com:mac:vml" xmlns:p="http://schemas.openxmlformats.org/presentationml/2006/main" xmlns:c="http://schemas.openxmlformats.org/drawingml/2006/chart" xmlns:dgm="http://schemas.openxmlformats.org/drawingml/2006/diagram" xmlns:o="urn:schemas-microsoft-com:office:office" xmlns:v="urn:schemas-microsoft-com:vml" xmlns:pvml="urn:schemas-microsoft-com:office:powerpoint" xmlns:com="http://schemas.openxmlformats.org/drawingml/2006/compatibility" xmlns:p14="http://schemas.microsoft.com/office/powerpoint/2010/main" xmlns:p15="http://schemas.microsoft.com/office/powerpoint/2012/main" xmlns:ahyp="http://schemas.microsoft.com/office/drawing/2018/hyperlinkcolor" showMasterPhAnim="0" showMasterSp="0">
+  <p:cSld>
+    <p:spTree>
+      <p:nvGrpSpPr>
+        <p:cNvPr id="127" name="Shape 127"/>
+        <p:cNvGrpSpPr/>
+        <p:nvPr/>
+      </p:nvGrpSpPr>
+      <p:grpSpPr>
+        <a:xfrm>
+          <a:off x="0" y="0"/>
+          <a:ext cx="0" cy="0"/>
+          <a:chOff x="0" y="0"/>
+          <a:chExt cx="0" cy="0"/>
+        </a:xfrm>
+      </p:grpSpPr>
+      <p:sp>
+        <p:nvSpPr>
+          <p:cNvPr id="128" name="Google Shape;128;g1aea58decbe_0_57:notes"/>
+          <p:cNvSpPr/>
+          <p:nvPr>
+            <p:ph idx="2" type="sldImg"/>
+          </p:nvPr>
+        </p:nvSpPr>
+        <p:spPr>
+          <a:xfrm>
+            <a:off x="381300" y="685800"/>
+            <a:ext cx="6096000" cy="3429000"/>
+          </a:xfrm>
+          <a:custGeom>
+            <a:rect b="b" l="l" r="r" t="t"/>
+            <a:pathLst>
+              <a:path extrusionOk="0" h="120000" w="120000">
+                <a:moveTo>
+                  <a:pt x="0" y="0"/>
+                </a:moveTo>
+                <a:lnTo>
+                  <a:pt x="120000" y="0"/>
+                </a:lnTo>
+                <a:lnTo>
+                  <a:pt x="120000" y="120000"/>
+                </a:lnTo>
+                <a:lnTo>
+                  <a:pt x="0" y="120000"/>
+                </a:lnTo>
+                <a:close/>
+              </a:path>
+            </a:pathLst>
+          </a:custGeom>
+        </p:spPr>
+      </p:sp>
+      <p:sp>
+        <p:nvSpPr>
+          <p:cNvPr id="129" name="Google Shape;129;g1aea58decbe_0_57:notes"/>
+          <p:cNvSpPr txBox="1"/>
+          <p:nvPr>
+            <p:ph idx="1" type="body"/>
+          </p:nvPr>
+        </p:nvSpPr>
+        <p:spPr>
+          <a:xfrm>
+            <a:off x="685800" y="4343400"/>
+            <a:ext cx="5486400" cy="4114800"/>
+          </a:xfrm>
+          <a:prstGeom prst="rect">
+            <a:avLst/>
+          </a:prstGeom>
+        </p:spPr>
+        <p:txBody>
+          <a:bodyPr anchorCtr="0" anchor="t" bIns="91425" lIns="91425" spcFirstLastPara="1" rIns="91425" wrap="square" tIns="91425">
+            <a:noAutofit/>
+          </a:bodyPr>
+          <a:lstStyle/>
+          <a:p>
+            <a:pPr indent="0" lvl="0" marL="0" rtl="0" algn="l">
+              <a:spcBef>
+                <a:spcPts val="0"/>
+              </a:spcBef>
+              <a:spcAft>
+                <a:spcPts val="0"/>
+              </a:spcAft>
+              <a:buNone/>
+            </a:pPr>
+            <a:r>
+              <a:t/>
+            </a:r>
+            <a:endParaRPr/>
+          </a:p>
+        </p:txBody>
+      </p:sp>
+    </p:spTree>
+  </p:cSld>
+  <p:clrMapOvr>
+    <a:masterClrMapping/>
+  </p:clrMapOvr>
+</p:notes>
+</file>
+
+<file path=ppt/notesSlides/notesSlide13.xml><?xml version="1.0" encoding="utf-8"?>
+<p:notes xmlns:a="http://schemas.openxmlformats.org/drawingml/2006/main" xmlns:r="http://schemas.openxmlformats.org/officeDocument/2006/relationships" xmlns:mc="http://schemas.openxmlformats.org/markup-compatibility/2006" xmlns:mv="urn:schemas-microsoft-com:mac:vml" xmlns:p="http://schemas.openxmlformats.org/presentationml/2006/main" xmlns:c="http://schemas.openxmlformats.org/drawingml/2006/chart" xmlns:dgm="http://schemas.openxmlformats.org/drawingml/2006/diagram" xmlns:o="urn:schemas-microsoft-com:office:office" xmlns:v="urn:schemas-microsoft-com:vml" xmlns:pvml="urn:schemas-microsoft-com:office:powerpoint" xmlns:com="http://schemas.openxmlformats.org/drawingml/2006/compatibility" xmlns:p14="http://schemas.microsoft.com/office/powerpoint/2010/main" xmlns:p15="http://schemas.microsoft.com/office/powerpoint/2012/main" xmlns:ahyp="http://schemas.microsoft.com/office/drawing/2018/hyperlinkcolor" showMasterPhAnim="0" showMasterSp="0">
+  <p:cSld>
+    <p:spTree>
+      <p:nvGrpSpPr>
+        <p:cNvPr id="133" name="Shape 133"/>
+        <p:cNvGrpSpPr/>
+        <p:nvPr/>
+      </p:nvGrpSpPr>
+      <p:grpSpPr>
+        <a:xfrm>
+          <a:off x="0" y="0"/>
+          <a:ext cx="0" cy="0"/>
+          <a:chOff x="0" y="0"/>
+          <a:chExt cx="0" cy="0"/>
+        </a:xfrm>
+      </p:grpSpPr>
+      <p:sp>
+        <p:nvSpPr>
+          <p:cNvPr id="134" name="Google Shape;134;g1aea58decbe_0_62:notes"/>
+          <p:cNvSpPr/>
+          <p:nvPr>
+            <p:ph idx="2" type="sldImg"/>
+          </p:nvPr>
+        </p:nvSpPr>
+        <p:spPr>
+          <a:xfrm>
+            <a:off x="381300" y="685800"/>
+            <a:ext cx="6096000" cy="3429000"/>
+          </a:xfrm>
+          <a:custGeom>
+            <a:rect b="b" l="l" r="r" t="t"/>
+            <a:pathLst>
+              <a:path extrusionOk="0" h="120000" w="120000">
+                <a:moveTo>
+                  <a:pt x="0" y="0"/>
+                </a:moveTo>
+                <a:lnTo>
+                  <a:pt x="120000" y="0"/>
+                </a:lnTo>
+                <a:lnTo>
+                  <a:pt x="120000" y="120000"/>
+                </a:lnTo>
+                <a:lnTo>
+                  <a:pt x="0" y="120000"/>
+                </a:lnTo>
+                <a:close/>
+              </a:path>
+            </a:pathLst>
+          </a:custGeom>
+        </p:spPr>
+      </p:sp>
+      <p:sp>
+        <p:nvSpPr>
+          <p:cNvPr id="135" name="Google Shape;135;g1aea58decbe_0_62:notes"/>
+          <p:cNvSpPr txBox="1"/>
+          <p:nvPr>
+            <p:ph idx="1" type="body"/>
+          </p:nvPr>
+        </p:nvSpPr>
+        <p:spPr>
+          <a:xfrm>
+            <a:off x="685800" y="4343400"/>
+            <a:ext cx="5486400" cy="4114800"/>
+          </a:xfrm>
+          <a:prstGeom prst="rect">
+            <a:avLst/>
+          </a:prstGeom>
+        </p:spPr>
+        <p:txBody>
+          <a:bodyPr anchorCtr="0" anchor="t" bIns="91425" lIns="91425" spcFirstLastPara="1" rIns="91425" wrap="square" tIns="91425">
+            <a:noAutofit/>
+          </a:bodyPr>
+          <a:lstStyle/>
+          <a:p>
+            <a:pPr indent="0" lvl="0" marL="0" rtl="0" algn="l">
+              <a:spcBef>
+                <a:spcPts val="0"/>
+              </a:spcBef>
+              <a:spcAft>
+                <a:spcPts val="0"/>
+              </a:spcAft>
+              <a:buNone/>
+            </a:pPr>
+            <a:r>
+              <a:t/>
+            </a:r>
+            <a:endParaRPr/>
+          </a:p>
+        </p:txBody>
+      </p:sp>
+    </p:spTree>
+  </p:cSld>
+  <p:clrMapOvr>
+    <a:masterClrMapping/>
+  </p:clrMapOvr>
+</p:notes>
+</file>
+
+<file path=ppt/notesSlides/notesSlide14.xml><?xml version="1.0" encoding="utf-8"?>
+<p:notes xmlns:a="http://schemas.openxmlformats.org/drawingml/2006/main" xmlns:r="http://schemas.openxmlformats.org/officeDocument/2006/relationships" xmlns:mc="http://schemas.openxmlformats.org/markup-compatibility/2006" xmlns:mv="urn:schemas-microsoft-com:mac:vml" xmlns:p="http://schemas.openxmlformats.org/presentationml/2006/main" xmlns:c="http://schemas.openxmlformats.org/drawingml/2006/chart" xmlns:dgm="http://schemas.openxmlformats.org/drawingml/2006/diagram" xmlns:o="urn:schemas-microsoft-com:office:office" xmlns:v="urn:schemas-microsoft-com:vml" xmlns:pvml="urn:schemas-microsoft-com:office:powerpoint" xmlns:com="http://schemas.openxmlformats.org/drawingml/2006/compatibility" xmlns:p14="http://schemas.microsoft.com/office/powerpoint/2010/main" xmlns:p15="http://schemas.microsoft.com/office/powerpoint/2012/main" xmlns:ahyp="http://schemas.microsoft.com/office/drawing/2018/hyperlinkcolor" showMasterPhAnim="0" showMasterSp="0">
+  <p:cSld>
+    <p:spTree>
+      <p:nvGrpSpPr>
+        <p:cNvPr id="139" name="Shape 139"/>
+        <p:cNvGrpSpPr/>
+        <p:nvPr/>
+      </p:nvGrpSpPr>
+      <p:grpSpPr>
+        <a:xfrm>
+          <a:off x="0" y="0"/>
+          <a:ext cx="0" cy="0"/>
+          <a:chOff x="0" y="0"/>
+          <a:chExt cx="0" cy="0"/>
+        </a:xfrm>
+      </p:grpSpPr>
+      <p:sp>
+        <p:nvSpPr>
+          <p:cNvPr id="140" name="Google Shape;140;g1aea58decbe_0_67:notes"/>
+          <p:cNvSpPr/>
+          <p:nvPr>
+            <p:ph idx="2" type="sldImg"/>
+          </p:nvPr>
+        </p:nvSpPr>
+        <p:spPr>
+          <a:xfrm>
+            <a:off x="381300" y="685800"/>
+            <a:ext cx="6096000" cy="3429000"/>
+          </a:xfrm>
+          <a:custGeom>
+            <a:rect b="b" l="l" r="r" t="t"/>
+            <a:pathLst>
+              <a:path extrusionOk="0" h="120000" w="120000">
+                <a:moveTo>
+                  <a:pt x="0" y="0"/>
+                </a:moveTo>
+                <a:lnTo>
+                  <a:pt x="120000" y="0"/>
+                </a:lnTo>
+                <a:lnTo>
+                  <a:pt x="120000" y="120000"/>
+                </a:lnTo>
+                <a:lnTo>
+                  <a:pt x="0" y="120000"/>
+                </a:lnTo>
+                <a:close/>
+              </a:path>
+            </a:pathLst>
+          </a:custGeom>
+        </p:spPr>
+      </p:sp>
+      <p:sp>
+        <p:nvSpPr>
+          <p:cNvPr id="141" name="Google Shape;141;g1aea58decbe_0_67:notes"/>
+          <p:cNvSpPr txBox="1"/>
+          <p:nvPr>
+            <p:ph idx="1" type="body"/>
+          </p:nvPr>
+        </p:nvSpPr>
+        <p:spPr>
+          <a:xfrm>
+            <a:off x="685800" y="4343400"/>
+            <a:ext cx="5486400" cy="4114800"/>
+          </a:xfrm>
+          <a:prstGeom prst="rect">
+            <a:avLst/>
+          </a:prstGeom>
+        </p:spPr>
+        <p:txBody>
+          <a:bodyPr anchorCtr="0" anchor="t" bIns="91425" lIns="91425" spcFirstLastPara="1" rIns="91425" wrap="square" tIns="91425">
+            <a:noAutofit/>
+          </a:bodyPr>
+          <a:lstStyle/>
+          <a:p>
+            <a:pPr indent="0" lvl="0" marL="0" rtl="0" algn="l">
+              <a:spcBef>
+                <a:spcPts val="0"/>
+              </a:spcBef>
+              <a:spcAft>
+                <a:spcPts val="0"/>
+              </a:spcAft>
+              <a:buNone/>
+            </a:pPr>
+            <a:r>
+              <a:t/>
+            </a:r>
+            <a:endParaRPr/>
+          </a:p>
+        </p:txBody>
+      </p:sp>
+    </p:spTree>
+  </p:cSld>
+  <p:clrMapOvr>
+    <a:masterClrMapping/>
+  </p:clrMapOvr>
+</p:notes>
+</file>
+
+<file path=ppt/notesSlides/notesSlide15.xml><?xml version="1.0" encoding="utf-8"?>
+<p:notes xmlns:a="http://schemas.openxmlformats.org/drawingml/2006/main" xmlns:r="http://schemas.openxmlformats.org/officeDocument/2006/relationships" xmlns:mc="http://schemas.openxmlformats.org/markup-compatibility/2006" xmlns:mv="urn:schemas-microsoft-com:mac:vml" xmlns:p="http://schemas.openxmlformats.org/presentationml/2006/main" xmlns:c="http://schemas.openxmlformats.org/drawingml/2006/chart" xmlns:dgm="http://schemas.openxmlformats.org/drawingml/2006/diagram" xmlns:o="urn:schemas-microsoft-com:office:office" xmlns:v="urn:schemas-microsoft-com:vml" xmlns:pvml="urn:schemas-microsoft-com:office:powerpoint" xmlns:com="http://schemas.openxmlformats.org/drawingml/2006/compatibility" xmlns:p14="http://schemas.microsoft.com/office/powerpoint/2010/main" xmlns:p15="http://schemas.microsoft.com/office/powerpoint/2012/main" xmlns:ahyp="http://schemas.microsoft.com/office/drawing/2018/hyperlinkcolor" showMasterPhAnim="0" showMasterSp="0">
+  <p:cSld>
+    <p:spTree>
+      <p:nvGrpSpPr>
+        <p:cNvPr id="144" name="Shape 144"/>
+        <p:cNvGrpSpPr/>
+        <p:nvPr/>
+      </p:nvGrpSpPr>
+      <p:grpSpPr>
+        <a:xfrm>
+          <a:off x="0" y="0"/>
+          <a:ext cx="0" cy="0"/>
+          <a:chOff x="0" y="0"/>
+          <a:chExt cx="0" cy="0"/>
+        </a:xfrm>
+      </p:grpSpPr>
+      <p:sp>
+        <p:nvSpPr>
+          <p:cNvPr id="145" name="Google Shape;145;g1899dbf5420_0_85:notes"/>
+          <p:cNvSpPr/>
+          <p:nvPr>
+            <p:ph idx="2" type="sldImg"/>
+          </p:nvPr>
+        </p:nvSpPr>
+        <p:spPr>
+          <a:xfrm>
+            <a:off x="381300" y="685800"/>
+            <a:ext cx="6096000" cy="3429000"/>
+          </a:xfrm>
+          <a:custGeom>
+            <a:rect b="b" l="l" r="r" t="t"/>
+            <a:pathLst>
+              <a:path extrusionOk="0" h="120000" w="120000">
+                <a:moveTo>
+                  <a:pt x="0" y="0"/>
+                </a:moveTo>
+                <a:lnTo>
+                  <a:pt x="120000" y="0"/>
+                </a:lnTo>
+                <a:lnTo>
+                  <a:pt x="120000" y="120000"/>
+                </a:lnTo>
+                <a:lnTo>
+                  <a:pt x="0" y="120000"/>
+                </a:lnTo>
+                <a:close/>
+              </a:path>
+            </a:pathLst>
+          </a:custGeom>
+        </p:spPr>
+      </p:sp>
+      <p:sp>
+        <p:nvSpPr>
+          <p:cNvPr id="146" name="Google Shape;146;g1899dbf5420_0_85:notes"/>
+          <p:cNvSpPr txBox="1"/>
+          <p:nvPr>
+            <p:ph idx="1" type="body"/>
+          </p:nvPr>
+        </p:nvSpPr>
+        <p:spPr>
+          <a:xfrm>
+            <a:off x="685800" y="4343400"/>
+            <a:ext cx="5486400" cy="4114800"/>
+          </a:xfrm>
+          <a:prstGeom prst="rect">
+            <a:avLst/>
+          </a:prstGeom>
+        </p:spPr>
+        <p:txBody>
+          <a:bodyPr anchorCtr="0" anchor="t" bIns="91425" lIns="91425" spcFirstLastPara="1" rIns="91425" wrap="square" tIns="91425">
+            <a:noAutofit/>
+          </a:bodyPr>
+          <a:lstStyle/>
+          <a:p>
+            <a:pPr indent="0" lvl="0" marL="0" rtl="0" algn="l">
+              <a:spcBef>
+                <a:spcPts val="0"/>
+              </a:spcBef>
+              <a:spcAft>
+                <a:spcPts val="0"/>
+              </a:spcAft>
+              <a:buNone/>
+            </a:pPr>
+            <a:r>
+              <a:t/>
+            </a:r>
+            <a:endParaRPr/>
+          </a:p>
+        </p:txBody>
+      </p:sp>
+    </p:spTree>
+  </p:cSld>
+  <p:clrMapOvr>
+    <a:masterClrMapping/>
+  </p:clrMapOvr>
+</p:notes>
+</file>
+
+<file path=ppt/notesSlides/notesSlide16.xml><?xml version="1.0" encoding="utf-8"?>
+<p:notes xmlns:a="http://schemas.openxmlformats.org/drawingml/2006/main" xmlns:r="http://schemas.openxmlformats.org/officeDocument/2006/relationships" xmlns:mc="http://schemas.openxmlformats.org/markup-compatibility/2006" xmlns:mv="urn:schemas-microsoft-com:mac:vml" xmlns:p="http://schemas.openxmlformats.org/presentationml/2006/main" xmlns:c="http://schemas.openxmlformats.org/drawingml/2006/chart" xmlns:dgm="http://schemas.openxmlformats.org/drawingml/2006/diagram" xmlns:o="urn:schemas-microsoft-com:office:office" xmlns:v="urn:schemas-microsoft-com:vml" xmlns:pvml="urn:schemas-microsoft-com:office:powerpoint" xmlns:com="http://schemas.openxmlformats.org/drawingml/2006/compatibility" xmlns:p14="http://schemas.microsoft.com/office/powerpoint/2010/main" xmlns:p15="http://schemas.microsoft.com/office/powerpoint/2012/main" xmlns:ahyp="http://schemas.microsoft.com/office/drawing/2018/hyperlinkcolor" showMasterPhAnim="0" showMasterSp="0">
+  <p:cSld>
+    <p:spTree>
+      <p:nvGrpSpPr>
+        <p:cNvPr id="150" name="Shape 150"/>
+        <p:cNvGrpSpPr/>
+        <p:nvPr/>
+      </p:nvGrpSpPr>
+      <p:grpSpPr>
+        <a:xfrm>
+          <a:off x="0" y="0"/>
+          <a:ext cx="0" cy="0"/>
+          <a:chOff x="0" y="0"/>
+          <a:chExt cx="0" cy="0"/>
+        </a:xfrm>
+      </p:grpSpPr>
+      <p:sp>
+        <p:nvSpPr>
+          <p:cNvPr id="151" name="Google Shape;151;g1899dbf5420_0_10:notes"/>
+          <p:cNvSpPr/>
+          <p:nvPr>
+            <p:ph idx="2" type="sldImg"/>
+          </p:nvPr>
+        </p:nvSpPr>
+        <p:spPr>
+          <a:xfrm>
+            <a:off x="381300" y="685800"/>
+            <a:ext cx="6096000" cy="3429000"/>
+          </a:xfrm>
+          <a:custGeom>
+            <a:rect b="b" l="l" r="r" t="t"/>
+            <a:pathLst>
+              <a:path extrusionOk="0" h="120000" w="120000">
+                <a:moveTo>
+                  <a:pt x="0" y="0"/>
+                </a:moveTo>
+                <a:lnTo>
+                  <a:pt x="120000" y="0"/>
+                </a:lnTo>
+                <a:lnTo>
+                  <a:pt x="120000" y="120000"/>
+                </a:lnTo>
+                <a:lnTo>
+                  <a:pt x="0" y="120000"/>
+                </a:lnTo>
+                <a:close/>
+              </a:path>
+            </a:pathLst>
+          </a:custGeom>
+        </p:spPr>
+      </p:sp>
+      <p:sp>
+        <p:nvSpPr>
+          <p:cNvPr id="152" name="Google Shape;152;g1899dbf5420_0_10:notes"/>
+          <p:cNvSpPr txBox="1"/>
+          <p:nvPr>
+            <p:ph idx="1" type="body"/>
+          </p:nvPr>
+        </p:nvSpPr>
+        <p:spPr>
+          <a:xfrm>
+            <a:off x="685800" y="4343400"/>
+            <a:ext cx="5486400" cy="4114800"/>
+          </a:xfrm>
+          <a:prstGeom prst="rect">
+            <a:avLst/>
+          </a:prstGeom>
+        </p:spPr>
+        <p:txBody>
+          <a:bodyPr anchorCtr="0" anchor="t" bIns="91425" lIns="91425" spcFirstLastPara="1" rIns="91425" wrap="square" tIns="91425">
+            <a:noAutofit/>
+          </a:bodyPr>
+          <a:lstStyle/>
+          <a:p>
+            <a:pPr indent="0" lvl="0" marL="0" rtl="0" algn="l">
+              <a:spcBef>
+                <a:spcPts val="0"/>
+              </a:spcBef>
+              <a:spcAft>
+                <a:spcPts val="0"/>
+              </a:spcAft>
+              <a:buNone/>
+            </a:pPr>
+            <a:r>
+              <a:t/>
+            </a:r>
+            <a:endParaRPr/>
+          </a:p>
+        </p:txBody>
+      </p:sp>
+    </p:spTree>
+  </p:cSld>
+  <p:clrMapOvr>
+    <a:masterClrMapping/>
+  </p:clrMapOvr>
+</p:notes>
+</file>
+
+<file path=ppt/notesSlides/notesSlide17.xml><?xml version="1.0" encoding="utf-8"?>
+<p:notes xmlns:a="http://schemas.openxmlformats.org/drawingml/2006/main" xmlns:r="http://schemas.openxmlformats.org/officeDocument/2006/relationships" xmlns:mc="http://schemas.openxmlformats.org/markup-compatibility/2006" xmlns:mv="urn:schemas-microsoft-com:mac:vml" xmlns:p="http://schemas.openxmlformats.org/presentationml/2006/main" xmlns:c="http://schemas.openxmlformats.org/drawingml/2006/chart" xmlns:dgm="http://schemas.openxmlformats.org/drawingml/2006/diagram" xmlns:o="urn:schemas-microsoft-com:office:office" xmlns:v="urn:schemas-microsoft-com:vml" xmlns:pvml="urn:schemas-microsoft-com:office:powerpoint" xmlns:com="http://schemas.openxmlformats.org/drawingml/2006/compatibility" xmlns:p14="http://schemas.microsoft.com/office/powerpoint/2010/main" xmlns:p15="http://schemas.microsoft.com/office/powerpoint/2012/main" xmlns:ahyp="http://schemas.microsoft.com/office/drawing/2018/hyperlinkcolor" showMasterPhAnim="0" showMasterSp="0">
+  <p:cSld>
+    <p:spTree>
+      <p:nvGrpSpPr>
+        <p:cNvPr id="156" name="Shape 156"/>
+        <p:cNvGrpSpPr/>
+        <p:nvPr/>
+      </p:nvGrpSpPr>
+      <p:grpSpPr>
+        <a:xfrm>
+          <a:off x="0" y="0"/>
+          <a:ext cx="0" cy="0"/>
+          <a:chOff x="0" y="0"/>
+          <a:chExt cx="0" cy="0"/>
+        </a:xfrm>
+      </p:grpSpPr>
+      <p:sp>
+        <p:nvSpPr>
+          <p:cNvPr id="157" name="Google Shape;157;g1899dbf5420_0_90:notes"/>
+          <p:cNvSpPr/>
+          <p:nvPr>
+            <p:ph idx="2" type="sldImg"/>
+          </p:nvPr>
+        </p:nvSpPr>
+        <p:spPr>
+          <a:xfrm>
+            <a:off x="381300" y="685800"/>
+            <a:ext cx="6096000" cy="3429000"/>
+          </a:xfrm>
+          <a:custGeom>
+            <a:rect b="b" l="l" r="r" t="t"/>
+            <a:pathLst>
+              <a:path extrusionOk="0" h="120000" w="120000">
+                <a:moveTo>
+                  <a:pt x="0" y="0"/>
+                </a:moveTo>
+                <a:lnTo>
+                  <a:pt x="120000" y="0"/>
+                </a:lnTo>
+                <a:lnTo>
+                  <a:pt x="120000" y="120000"/>
+                </a:lnTo>
+                <a:lnTo>
+                  <a:pt x="0" y="120000"/>
+                </a:lnTo>
+                <a:close/>
+              </a:path>
+            </a:pathLst>
+          </a:custGeom>
+        </p:spPr>
+      </p:sp>
+      <p:sp>
+        <p:nvSpPr>
+          <p:cNvPr id="158" name="Google Shape;158;g1899dbf5420_0_90:notes"/>
+          <p:cNvSpPr txBox="1"/>
+          <p:nvPr>
+            <p:ph idx="1" type="body"/>
+          </p:nvPr>
+        </p:nvSpPr>
+        <p:spPr>
+          <a:xfrm>
+            <a:off x="685800" y="4343400"/>
+            <a:ext cx="5486400" cy="4114800"/>
+          </a:xfrm>
+          <a:prstGeom prst="rect">
+            <a:avLst/>
+          </a:prstGeom>
+        </p:spPr>
+        <p:txBody>
+          <a:bodyPr anchorCtr="0" anchor="t" bIns="91425" lIns="91425" spcFirstLastPara="1" rIns="91425" wrap="square" tIns="91425">
+            <a:noAutofit/>
+          </a:bodyPr>
+          <a:lstStyle/>
+          <a:p>
+            <a:pPr indent="0" lvl="0" marL="0" rtl="0" algn="l">
+              <a:spcBef>
+                <a:spcPts val="0"/>
+              </a:spcBef>
+              <a:spcAft>
+                <a:spcPts val="0"/>
+              </a:spcAft>
+              <a:buNone/>
+            </a:pPr>
+            <a:r>
+              <a:t/>
+            </a:r>
+            <a:endParaRPr/>
+          </a:p>
+        </p:txBody>
+      </p:sp>
+    </p:spTree>
+  </p:cSld>
+  <p:clrMapOvr>
+    <a:masterClrMapping/>
+  </p:clrMapOvr>
+</p:notes>
+</file>
+
 <file path=ppt/notesSlides/notesSlide2.xml><?xml version="1.0" encoding="utf-8"?>
 <p:notes xmlns:a="http://schemas.openxmlformats.org/drawingml/2006/main" xmlns:r="http://schemas.openxmlformats.org/officeDocument/2006/relationships" xmlns:mc="http://schemas.openxmlformats.org/markup-compatibility/2006" xmlns:mv="urn:schemas-microsoft-com:mac:vml" xmlns:p="http://schemas.openxmlformats.org/presentationml/2006/main" xmlns:c="http://schemas.openxmlformats.org/drawingml/2006/chart" xmlns:dgm="http://schemas.openxmlformats.org/drawingml/2006/diagram" xmlns:o="urn:schemas-microsoft-com:office:office" xmlns:v="urn:schemas-microsoft-com:vml" xmlns:pvml="urn:schemas-microsoft-com:office:powerpoint" xmlns:com="http://schemas.openxmlformats.org/drawingml/2006/compatibility" xmlns:p14="http://schemas.microsoft.com/office/powerpoint/2010/main" xmlns:p15="http://schemas.microsoft.com/office/powerpoint/2012/main" xmlns:ahyp="http://schemas.microsoft.com/office/drawing/2018/hyperlinkcolor" showMasterPhAnim="0" showMasterSp="0">
   <p:cSld>
@@ -1216,7 +2080,7 @@
       </p:grpSpPr>
       <p:sp>
         <p:nvSpPr>
-          <p:cNvPr id="93" name="Google Shape;93;g1899dbf5420_0_85:notes"/>
+          <p:cNvPr id="93" name="Google Shape;93;g1aea58decbe_0_45:notes"/>
           <p:cNvSpPr/>
           <p:nvPr>
             <p:ph idx="2" type="sldImg"/>
@@ -1251,7 +2115,7 @@
       </p:sp>
       <p:sp>
         <p:nvSpPr>
-          <p:cNvPr id="94" name="Google Shape;94;g1899dbf5420_0_85:notes"/>
+          <p:cNvPr id="94" name="Google Shape;94;g1aea58decbe_0_45:notes"/>
           <p:cNvSpPr txBox="1"/>
           <p:nvPr>
             <p:ph idx="1" type="body"/>
@@ -1315,7 +2179,7 @@
       </p:grpSpPr>
       <p:sp>
         <p:nvSpPr>
-          <p:cNvPr id="99" name="Google Shape;99;g1899dbf5420_0_10:notes"/>
+          <p:cNvPr id="99" name="Google Shape;99;g1aea58decbe_0_0:notes"/>
           <p:cNvSpPr/>
           <p:nvPr>
             <p:ph idx="2" type="sldImg"/>
@@ -1350,7 +2214,7 @@
       </p:sp>
       <p:sp>
         <p:nvSpPr>
-          <p:cNvPr id="100" name="Google Shape;100;g1899dbf5420_0_10:notes"/>
+          <p:cNvPr id="100" name="Google Shape;100;g1aea58decbe_0_0:notes"/>
           <p:cNvSpPr txBox="1"/>
           <p:nvPr>
             <p:ph idx="1" type="body"/>
@@ -1414,7 +2278,7 @@
       </p:grpSpPr>
       <p:sp>
         <p:nvSpPr>
-          <p:cNvPr id="105" name="Google Shape;105;g1899dbf5420_0_90:notes"/>
+          <p:cNvPr id="105" name="Google Shape;105;g1aea58decbe_0_40:notes"/>
           <p:cNvSpPr/>
           <p:nvPr>
             <p:ph idx="2" type="sldImg"/>
@@ -1449,7 +2313,106 @@
       </p:sp>
       <p:sp>
         <p:nvSpPr>
-          <p:cNvPr id="106" name="Google Shape;106;g1899dbf5420_0_90:notes"/>
+          <p:cNvPr id="106" name="Google Shape;106;g1aea58decbe_0_40:notes"/>
+          <p:cNvSpPr txBox="1"/>
+          <p:nvPr>
+            <p:ph idx="1" type="body"/>
+          </p:nvPr>
+        </p:nvSpPr>
+        <p:spPr>
+          <a:xfrm>
+            <a:off x="685800" y="4343400"/>
+            <a:ext cx="5486400" cy="4114800"/>
+          </a:xfrm>
+          <a:prstGeom prst="rect">
+            <a:avLst/>
+          </a:prstGeom>
+        </p:spPr>
+        <p:txBody>
+          <a:bodyPr anchorCtr="0" anchor="t" bIns="91425" lIns="91425" spcFirstLastPara="1" rIns="91425" wrap="square" tIns="91425">
+            <a:noAutofit/>
+          </a:bodyPr>
+          <a:lstStyle/>
+          <a:p>
+            <a:pPr indent="0" lvl="0" marL="0" rtl="0" algn="l">
+              <a:spcBef>
+                <a:spcPts val="0"/>
+              </a:spcBef>
+              <a:spcAft>
+                <a:spcPts val="0"/>
+              </a:spcAft>
+              <a:buNone/>
+            </a:pPr>
+            <a:r>
+              <a:t/>
+            </a:r>
+            <a:endParaRPr/>
+          </a:p>
+        </p:txBody>
+      </p:sp>
+    </p:spTree>
+  </p:cSld>
+  <p:clrMapOvr>
+    <a:masterClrMapping/>
+  </p:clrMapOvr>
+</p:notes>
+</file>
+
+<file path=ppt/notesSlides/notesSlide9.xml><?xml version="1.0" encoding="utf-8"?>
+<p:notes xmlns:a="http://schemas.openxmlformats.org/drawingml/2006/main" xmlns:r="http://schemas.openxmlformats.org/officeDocument/2006/relationships" xmlns:mc="http://schemas.openxmlformats.org/markup-compatibility/2006" xmlns:mv="urn:schemas-microsoft-com:mac:vml" xmlns:p="http://schemas.openxmlformats.org/presentationml/2006/main" xmlns:c="http://schemas.openxmlformats.org/drawingml/2006/chart" xmlns:dgm="http://schemas.openxmlformats.org/drawingml/2006/diagram" xmlns:o="urn:schemas-microsoft-com:office:office" xmlns:v="urn:schemas-microsoft-com:vml" xmlns:pvml="urn:schemas-microsoft-com:office:powerpoint" xmlns:com="http://schemas.openxmlformats.org/drawingml/2006/compatibility" xmlns:p14="http://schemas.microsoft.com/office/powerpoint/2010/main" xmlns:p15="http://schemas.microsoft.com/office/powerpoint/2012/main" xmlns:ahyp="http://schemas.microsoft.com/office/drawing/2018/hyperlinkcolor" showMasterPhAnim="0" showMasterSp="0">
+  <p:cSld>
+    <p:spTree>
+      <p:nvGrpSpPr>
+        <p:cNvPr id="110" name="Shape 110"/>
+        <p:cNvGrpSpPr/>
+        <p:nvPr/>
+      </p:nvGrpSpPr>
+      <p:grpSpPr>
+        <a:xfrm>
+          <a:off x="0" y="0"/>
+          <a:ext cx="0" cy="0"/>
+          <a:chOff x="0" y="0"/>
+          <a:chExt cx="0" cy="0"/>
+        </a:xfrm>
+      </p:grpSpPr>
+      <p:sp>
+        <p:nvSpPr>
+          <p:cNvPr id="111" name="Google Shape;111;g1aea58decbe_0_33:notes"/>
+          <p:cNvSpPr/>
+          <p:nvPr>
+            <p:ph idx="2" type="sldImg"/>
+          </p:nvPr>
+        </p:nvSpPr>
+        <p:spPr>
+          <a:xfrm>
+            <a:off x="381300" y="685800"/>
+            <a:ext cx="6096000" cy="3429000"/>
+          </a:xfrm>
+          <a:custGeom>
+            <a:rect b="b" l="l" r="r" t="t"/>
+            <a:pathLst>
+              <a:path extrusionOk="0" h="120000" w="120000">
+                <a:moveTo>
+                  <a:pt x="0" y="0"/>
+                </a:moveTo>
+                <a:lnTo>
+                  <a:pt x="120000" y="0"/>
+                </a:lnTo>
+                <a:lnTo>
+                  <a:pt x="120000" y="120000"/>
+                </a:lnTo>
+                <a:lnTo>
+                  <a:pt x="0" y="120000"/>
+                </a:lnTo>
+                <a:close/>
+              </a:path>
+            </a:pathLst>
+          </a:custGeom>
+        </p:spPr>
+      </p:sp>
+      <p:sp>
+        <p:nvSpPr>
+          <p:cNvPr id="112" name="Google Shape;112;g1aea58decbe_0_33:notes"/>
           <p:cNvSpPr txBox="1"/>
           <p:nvPr>
             <p:ph idx="1" type="body"/>
@@ -7447,7 +8410,7 @@
             </a:pPr>
             <a:r>
               <a:rPr lang="pt-BR"/>
-              <a:t>Explicabilidade em Modelos Baseados em (De)Convolução</a:t>
+              <a:t>Explicabilidade em Modelos de Redes Neurais Convolucionais (CNN)</a:t>
             </a:r>
             <a:endParaRPr/>
           </a:p>
@@ -7569,7 +8532,7 @@
             </a:pPr>
             <a:r>
               <a:rPr b="1" lang="pt-BR"/>
-              <a:t>Aluno</a:t>
+              <a:t>Aluno Extraordinário</a:t>
             </a:r>
             <a:endParaRPr b="1"/>
           </a:p>
@@ -7627,6 +8590,850 @@
             <a:r>
               <a:rPr lang="pt-BR"/>
               <a:t>Unirio</a:t>
+            </a:r>
+            <a:endParaRPr/>
+          </a:p>
+        </p:txBody>
+      </p:sp>
+    </p:spTree>
+  </p:cSld>
+  <p:clrMapOvr>
+    <a:masterClrMapping/>
+  </p:clrMapOvr>
+</p:sld>
+</file>
+
+<file path=ppt/slides/slide10.xml><?xml version="1.0" encoding="utf-8"?>
+<p:sld xmlns:a="http://schemas.openxmlformats.org/drawingml/2006/main" xmlns:r="http://schemas.openxmlformats.org/officeDocument/2006/relationships" xmlns:mc="http://schemas.openxmlformats.org/markup-compatibility/2006" xmlns:mv="urn:schemas-microsoft-com:mac:vml" xmlns:p="http://schemas.openxmlformats.org/presentationml/2006/main" xmlns:c="http://schemas.openxmlformats.org/drawingml/2006/chart" xmlns:dgm="http://schemas.openxmlformats.org/drawingml/2006/diagram" xmlns:o="urn:schemas-microsoft-com:office:office" xmlns:v="urn:schemas-microsoft-com:vml" xmlns:pvml="urn:schemas-microsoft-com:office:powerpoint" xmlns:com="http://schemas.openxmlformats.org/drawingml/2006/compatibility" xmlns:p14="http://schemas.microsoft.com/office/powerpoint/2010/main" xmlns:p15="http://schemas.microsoft.com/office/powerpoint/2012/main" xmlns:ahyp="http://schemas.microsoft.com/office/drawing/2018/hyperlinkcolor">
+  <p:cSld>
+    <p:spTree>
+      <p:nvGrpSpPr>
+        <p:cNvPr id="119" name="Shape 119"/>
+        <p:cNvGrpSpPr/>
+        <p:nvPr/>
+      </p:nvGrpSpPr>
+      <p:grpSpPr>
+        <a:xfrm>
+          <a:off x="0" y="0"/>
+          <a:ext cx="0" cy="0"/>
+          <a:chOff x="0" y="0"/>
+          <a:chExt cx="0" cy="0"/>
+        </a:xfrm>
+      </p:grpSpPr>
+      <p:sp>
+        <p:nvSpPr>
+          <p:cNvPr id="120" name="Google Shape;120;p22"/>
+          <p:cNvSpPr txBox="1"/>
+          <p:nvPr>
+            <p:ph type="title"/>
+          </p:nvPr>
+        </p:nvSpPr>
+        <p:spPr>
+          <a:xfrm>
+            <a:off x="460950" y="2065350"/>
+            <a:ext cx="8222100" cy="1012800"/>
+          </a:xfrm>
+          <a:prstGeom prst="rect">
+            <a:avLst/>
+          </a:prstGeom>
+        </p:spPr>
+        <p:txBody>
+          <a:bodyPr anchorCtr="0" anchor="ctr" bIns="91425" lIns="91425" spcFirstLastPara="1" rIns="91425" wrap="square" tIns="91425">
+            <a:normAutofit/>
+          </a:bodyPr>
+          <a:lstStyle/>
+          <a:p>
+            <a:pPr indent="0" lvl="0" marL="0" rtl="0" algn="l">
+              <a:spcBef>
+                <a:spcPts val="0"/>
+              </a:spcBef>
+              <a:spcAft>
+                <a:spcPts val="0"/>
+              </a:spcAft>
+              <a:buNone/>
+            </a:pPr>
+            <a:r>
+              <a:rPr lang="pt-BR"/>
+              <a:t>Resultados</a:t>
+            </a:r>
+            <a:endParaRPr/>
+          </a:p>
+        </p:txBody>
+      </p:sp>
+    </p:spTree>
+  </p:cSld>
+  <p:clrMapOvr>
+    <a:masterClrMapping/>
+  </p:clrMapOvr>
+</p:sld>
+</file>
+
+<file path=ppt/slides/slide11.xml><?xml version="1.0" encoding="utf-8"?>
+<p:sld xmlns:a="http://schemas.openxmlformats.org/drawingml/2006/main" xmlns:r="http://schemas.openxmlformats.org/officeDocument/2006/relationships" xmlns:mc="http://schemas.openxmlformats.org/markup-compatibility/2006" xmlns:mv="urn:schemas-microsoft-com:mac:vml" xmlns:p="http://schemas.openxmlformats.org/presentationml/2006/main" xmlns:c="http://schemas.openxmlformats.org/drawingml/2006/chart" xmlns:dgm="http://schemas.openxmlformats.org/drawingml/2006/diagram" xmlns:o="urn:schemas-microsoft-com:office:office" xmlns:v="urn:schemas-microsoft-com:vml" xmlns:pvml="urn:schemas-microsoft-com:office:powerpoint" xmlns:com="http://schemas.openxmlformats.org/drawingml/2006/compatibility" xmlns:p14="http://schemas.microsoft.com/office/powerpoint/2010/main" xmlns:p15="http://schemas.microsoft.com/office/powerpoint/2012/main" xmlns:ahyp="http://schemas.microsoft.com/office/drawing/2018/hyperlinkcolor">
+  <p:cSld>
+    <p:spTree>
+      <p:nvGrpSpPr>
+        <p:cNvPr id="124" name="Shape 124"/>
+        <p:cNvGrpSpPr/>
+        <p:nvPr/>
+      </p:nvGrpSpPr>
+      <p:grpSpPr>
+        <a:xfrm>
+          <a:off x="0" y="0"/>
+          <a:ext cx="0" cy="0"/>
+          <a:chOff x="0" y="0"/>
+          <a:chExt cx="0" cy="0"/>
+        </a:xfrm>
+      </p:grpSpPr>
+      <p:sp>
+        <p:nvSpPr>
+          <p:cNvPr id="125" name="Google Shape;125;p23"/>
+          <p:cNvSpPr txBox="1"/>
+          <p:nvPr>
+            <p:ph type="title"/>
+          </p:nvPr>
+        </p:nvSpPr>
+        <p:spPr>
+          <a:xfrm>
+            <a:off x="471900" y="738725"/>
+            <a:ext cx="8222100" cy="767700"/>
+          </a:xfrm>
+          <a:prstGeom prst="rect">
+            <a:avLst/>
+          </a:prstGeom>
+        </p:spPr>
+        <p:txBody>
+          <a:bodyPr anchorCtr="0" anchor="b" bIns="91425" lIns="91425" spcFirstLastPara="1" rIns="91425" wrap="square" tIns="91425">
+            <a:normAutofit/>
+          </a:bodyPr>
+          <a:lstStyle/>
+          <a:p>
+            <a:pPr indent="0" lvl="0" marL="0" rtl="0" algn="l">
+              <a:spcBef>
+                <a:spcPts val="0"/>
+              </a:spcBef>
+              <a:spcAft>
+                <a:spcPts val="0"/>
+              </a:spcAft>
+              <a:buNone/>
+            </a:pPr>
+            <a:r>
+              <a:rPr lang="pt-BR"/>
+              <a:t>kernel_size = (4, 4)</a:t>
+            </a:r>
+            <a:endParaRPr/>
+          </a:p>
+        </p:txBody>
+      </p:sp>
+      <p:sp>
+        <p:nvSpPr>
+          <p:cNvPr id="126" name="Google Shape;126;p23"/>
+          <p:cNvSpPr txBox="1"/>
+          <p:nvPr>
+            <p:ph idx="1" type="body"/>
+          </p:nvPr>
+        </p:nvSpPr>
+        <p:spPr>
+          <a:xfrm>
+            <a:off x="471900" y="1919075"/>
+            <a:ext cx="8222100" cy="2710200"/>
+          </a:xfrm>
+          <a:prstGeom prst="rect">
+            <a:avLst/>
+          </a:prstGeom>
+        </p:spPr>
+        <p:txBody>
+          <a:bodyPr anchorCtr="0" anchor="t" bIns="91425" lIns="91425" spcFirstLastPara="1" rIns="91425" wrap="square" tIns="91425">
+            <a:normAutofit/>
+          </a:bodyPr>
+          <a:lstStyle/>
+          <a:p>
+            <a:pPr indent="0" lvl="0" marL="0" rtl="0" algn="l">
+              <a:spcBef>
+                <a:spcPts val="0"/>
+              </a:spcBef>
+              <a:spcAft>
+                <a:spcPts val="1200"/>
+              </a:spcAft>
+              <a:buNone/>
+            </a:pPr>
+            <a:r>
+              <a:t/>
+            </a:r>
+            <a:endParaRPr/>
+          </a:p>
+        </p:txBody>
+      </p:sp>
+    </p:spTree>
+  </p:cSld>
+  <p:clrMapOvr>
+    <a:masterClrMapping/>
+  </p:clrMapOvr>
+</p:sld>
+</file>
+
+<file path=ppt/slides/slide12.xml><?xml version="1.0" encoding="utf-8"?>
+<p:sld xmlns:a="http://schemas.openxmlformats.org/drawingml/2006/main" xmlns:r="http://schemas.openxmlformats.org/officeDocument/2006/relationships" xmlns:mc="http://schemas.openxmlformats.org/markup-compatibility/2006" xmlns:mv="urn:schemas-microsoft-com:mac:vml" xmlns:p="http://schemas.openxmlformats.org/presentationml/2006/main" xmlns:c="http://schemas.openxmlformats.org/drawingml/2006/chart" xmlns:dgm="http://schemas.openxmlformats.org/drawingml/2006/diagram" xmlns:o="urn:schemas-microsoft-com:office:office" xmlns:v="urn:schemas-microsoft-com:vml" xmlns:pvml="urn:schemas-microsoft-com:office:powerpoint" xmlns:com="http://schemas.openxmlformats.org/drawingml/2006/compatibility" xmlns:p14="http://schemas.microsoft.com/office/powerpoint/2010/main" xmlns:p15="http://schemas.microsoft.com/office/powerpoint/2012/main" xmlns:ahyp="http://schemas.microsoft.com/office/drawing/2018/hyperlinkcolor">
+  <p:cSld>
+    <p:spTree>
+      <p:nvGrpSpPr>
+        <p:cNvPr id="130" name="Shape 130"/>
+        <p:cNvGrpSpPr/>
+        <p:nvPr/>
+      </p:nvGrpSpPr>
+      <p:grpSpPr>
+        <a:xfrm>
+          <a:off x="0" y="0"/>
+          <a:ext cx="0" cy="0"/>
+          <a:chOff x="0" y="0"/>
+          <a:chExt cx="0" cy="0"/>
+        </a:xfrm>
+      </p:grpSpPr>
+      <p:sp>
+        <p:nvSpPr>
+          <p:cNvPr id="131" name="Google Shape;131;p24"/>
+          <p:cNvSpPr txBox="1"/>
+          <p:nvPr>
+            <p:ph type="title"/>
+          </p:nvPr>
+        </p:nvSpPr>
+        <p:spPr>
+          <a:xfrm>
+            <a:off x="471900" y="738725"/>
+            <a:ext cx="8222100" cy="767700"/>
+          </a:xfrm>
+          <a:prstGeom prst="rect">
+            <a:avLst/>
+          </a:prstGeom>
+        </p:spPr>
+        <p:txBody>
+          <a:bodyPr anchorCtr="0" anchor="b" bIns="91425" lIns="91425" spcFirstLastPara="1" rIns="91425" wrap="square" tIns="91425">
+            <a:normAutofit/>
+          </a:bodyPr>
+          <a:lstStyle/>
+          <a:p>
+            <a:pPr indent="0" lvl="0" marL="0" rtl="0" algn="l">
+              <a:spcBef>
+                <a:spcPts val="0"/>
+              </a:spcBef>
+              <a:spcAft>
+                <a:spcPts val="0"/>
+              </a:spcAft>
+              <a:buNone/>
+            </a:pPr>
+            <a:r>
+              <a:rPr lang="pt-BR"/>
+              <a:t>kernel_size = (11, 11)</a:t>
+            </a:r>
+            <a:endParaRPr/>
+          </a:p>
+        </p:txBody>
+      </p:sp>
+      <p:sp>
+        <p:nvSpPr>
+          <p:cNvPr id="132" name="Google Shape;132;p24"/>
+          <p:cNvSpPr txBox="1"/>
+          <p:nvPr>
+            <p:ph idx="1" type="body"/>
+          </p:nvPr>
+        </p:nvSpPr>
+        <p:spPr>
+          <a:xfrm>
+            <a:off x="471900" y="1919075"/>
+            <a:ext cx="8222100" cy="2710200"/>
+          </a:xfrm>
+          <a:prstGeom prst="rect">
+            <a:avLst/>
+          </a:prstGeom>
+        </p:spPr>
+        <p:txBody>
+          <a:bodyPr anchorCtr="0" anchor="t" bIns="91425" lIns="91425" spcFirstLastPara="1" rIns="91425" wrap="square" tIns="91425">
+            <a:normAutofit/>
+          </a:bodyPr>
+          <a:lstStyle/>
+          <a:p>
+            <a:pPr indent="0" lvl="0" marL="0" rtl="0" algn="l">
+              <a:spcBef>
+                <a:spcPts val="0"/>
+              </a:spcBef>
+              <a:spcAft>
+                <a:spcPts val="1200"/>
+              </a:spcAft>
+              <a:buNone/>
+            </a:pPr>
+            <a:r>
+              <a:t/>
+            </a:r>
+            <a:endParaRPr/>
+          </a:p>
+        </p:txBody>
+      </p:sp>
+    </p:spTree>
+  </p:cSld>
+  <p:clrMapOvr>
+    <a:masterClrMapping/>
+  </p:clrMapOvr>
+</p:sld>
+</file>
+
+<file path=ppt/slides/slide13.xml><?xml version="1.0" encoding="utf-8"?>
+<p:sld xmlns:a="http://schemas.openxmlformats.org/drawingml/2006/main" xmlns:r="http://schemas.openxmlformats.org/officeDocument/2006/relationships" xmlns:mc="http://schemas.openxmlformats.org/markup-compatibility/2006" xmlns:mv="urn:schemas-microsoft-com:mac:vml" xmlns:p="http://schemas.openxmlformats.org/presentationml/2006/main" xmlns:c="http://schemas.openxmlformats.org/drawingml/2006/chart" xmlns:dgm="http://schemas.openxmlformats.org/drawingml/2006/diagram" xmlns:o="urn:schemas-microsoft-com:office:office" xmlns:v="urn:schemas-microsoft-com:vml" xmlns:pvml="urn:schemas-microsoft-com:office:powerpoint" xmlns:com="http://schemas.openxmlformats.org/drawingml/2006/compatibility" xmlns:p14="http://schemas.microsoft.com/office/powerpoint/2010/main" xmlns:p15="http://schemas.microsoft.com/office/powerpoint/2012/main" xmlns:ahyp="http://schemas.microsoft.com/office/drawing/2018/hyperlinkcolor">
+  <p:cSld>
+    <p:spTree>
+      <p:nvGrpSpPr>
+        <p:cNvPr id="136" name="Shape 136"/>
+        <p:cNvGrpSpPr/>
+        <p:nvPr/>
+      </p:nvGrpSpPr>
+      <p:grpSpPr>
+        <a:xfrm>
+          <a:off x="0" y="0"/>
+          <a:ext cx="0" cy="0"/>
+          <a:chOff x="0" y="0"/>
+          <a:chExt cx="0" cy="0"/>
+        </a:xfrm>
+      </p:grpSpPr>
+      <p:sp>
+        <p:nvSpPr>
+          <p:cNvPr id="137" name="Google Shape;137;p25"/>
+          <p:cNvSpPr txBox="1"/>
+          <p:nvPr>
+            <p:ph type="title"/>
+          </p:nvPr>
+        </p:nvSpPr>
+        <p:spPr>
+          <a:xfrm>
+            <a:off x="471900" y="738725"/>
+            <a:ext cx="8222100" cy="767700"/>
+          </a:xfrm>
+          <a:prstGeom prst="rect">
+            <a:avLst/>
+          </a:prstGeom>
+        </p:spPr>
+        <p:txBody>
+          <a:bodyPr anchorCtr="0" anchor="b" bIns="91425" lIns="91425" spcFirstLastPara="1" rIns="91425" wrap="square" tIns="91425">
+            <a:normAutofit/>
+          </a:bodyPr>
+          <a:lstStyle/>
+          <a:p>
+            <a:pPr indent="0" lvl="0" marL="0" rtl="0" algn="l">
+              <a:spcBef>
+                <a:spcPts val="0"/>
+              </a:spcBef>
+              <a:spcAft>
+                <a:spcPts val="0"/>
+              </a:spcAft>
+              <a:buNone/>
+            </a:pPr>
+            <a:r>
+              <a:rPr lang="pt-BR"/>
+              <a:t>kernel_size = (18, 18)</a:t>
+            </a:r>
+            <a:endParaRPr/>
+          </a:p>
+        </p:txBody>
+      </p:sp>
+      <p:sp>
+        <p:nvSpPr>
+          <p:cNvPr id="138" name="Google Shape;138;p25"/>
+          <p:cNvSpPr txBox="1"/>
+          <p:nvPr>
+            <p:ph idx="1" type="body"/>
+          </p:nvPr>
+        </p:nvSpPr>
+        <p:spPr>
+          <a:xfrm>
+            <a:off x="471900" y="1919075"/>
+            <a:ext cx="8222100" cy="2710200"/>
+          </a:xfrm>
+          <a:prstGeom prst="rect">
+            <a:avLst/>
+          </a:prstGeom>
+        </p:spPr>
+        <p:txBody>
+          <a:bodyPr anchorCtr="0" anchor="t" bIns="91425" lIns="91425" spcFirstLastPara="1" rIns="91425" wrap="square" tIns="91425">
+            <a:normAutofit/>
+          </a:bodyPr>
+          <a:lstStyle/>
+          <a:p>
+            <a:pPr indent="0" lvl="0" marL="0" rtl="0" algn="l">
+              <a:spcBef>
+                <a:spcPts val="0"/>
+              </a:spcBef>
+              <a:spcAft>
+                <a:spcPts val="1200"/>
+              </a:spcAft>
+              <a:buNone/>
+            </a:pPr>
+            <a:r>
+              <a:t/>
+            </a:r>
+            <a:endParaRPr/>
+          </a:p>
+        </p:txBody>
+      </p:sp>
+    </p:spTree>
+  </p:cSld>
+  <p:clrMapOvr>
+    <a:masterClrMapping/>
+  </p:clrMapOvr>
+</p:sld>
+</file>
+
+<file path=ppt/slides/slide14.xml><?xml version="1.0" encoding="utf-8"?>
+<p:sld xmlns:a="http://schemas.openxmlformats.org/drawingml/2006/main" xmlns:r="http://schemas.openxmlformats.org/officeDocument/2006/relationships" xmlns:mc="http://schemas.openxmlformats.org/markup-compatibility/2006" xmlns:mv="urn:schemas-microsoft-com:mac:vml" xmlns:p="http://schemas.openxmlformats.org/presentationml/2006/main" xmlns:c="http://schemas.openxmlformats.org/drawingml/2006/chart" xmlns:dgm="http://schemas.openxmlformats.org/drawingml/2006/diagram" xmlns:o="urn:schemas-microsoft-com:office:office" xmlns:v="urn:schemas-microsoft-com:vml" xmlns:pvml="urn:schemas-microsoft-com:office:powerpoint" xmlns:com="http://schemas.openxmlformats.org/drawingml/2006/compatibility" xmlns:p14="http://schemas.microsoft.com/office/powerpoint/2010/main" xmlns:p15="http://schemas.microsoft.com/office/powerpoint/2012/main" xmlns:ahyp="http://schemas.microsoft.com/office/drawing/2018/hyperlinkcolor">
+  <p:cSld>
+    <p:spTree>
+      <p:nvGrpSpPr>
+        <p:cNvPr id="142" name="Shape 142"/>
+        <p:cNvGrpSpPr/>
+        <p:nvPr/>
+      </p:nvGrpSpPr>
+      <p:grpSpPr>
+        <a:xfrm>
+          <a:off x="0" y="0"/>
+          <a:ext cx="0" cy="0"/>
+          <a:chOff x="0" y="0"/>
+          <a:chExt cx="0" cy="0"/>
+        </a:xfrm>
+      </p:grpSpPr>
+      <p:sp>
+        <p:nvSpPr>
+          <p:cNvPr id="143" name="Google Shape;143;p26"/>
+          <p:cNvSpPr txBox="1"/>
+          <p:nvPr>
+            <p:ph type="title"/>
+          </p:nvPr>
+        </p:nvSpPr>
+        <p:spPr>
+          <a:xfrm>
+            <a:off x="460950" y="2065350"/>
+            <a:ext cx="8222100" cy="1012800"/>
+          </a:xfrm>
+          <a:prstGeom prst="rect">
+            <a:avLst/>
+          </a:prstGeom>
+        </p:spPr>
+        <p:txBody>
+          <a:bodyPr anchorCtr="0" anchor="ctr" bIns="91425" lIns="91425" spcFirstLastPara="1" rIns="91425" wrap="square" tIns="91425">
+            <a:normAutofit fontScale="90000"/>
+          </a:bodyPr>
+          <a:lstStyle/>
+          <a:p>
+            <a:pPr indent="0" lvl="0" marL="0" rtl="0" algn="l">
+              <a:spcBef>
+                <a:spcPts val="0"/>
+              </a:spcBef>
+              <a:spcAft>
+                <a:spcPts val="0"/>
+              </a:spcAft>
+              <a:buNone/>
+            </a:pPr>
+            <a:r>
+              <a:rPr lang="pt-BR"/>
+              <a:t>Resultados do Melhor Modelo</a:t>
+            </a:r>
+            <a:r>
+              <a:rPr lang="pt-BR"/>
+              <a:t> </a:t>
+            </a:r>
+            <a:r>
+              <a:rPr lang="pt-BR"/>
+              <a:t>(ks = ???)</a:t>
+            </a:r>
+            <a:endParaRPr/>
+          </a:p>
+        </p:txBody>
+      </p:sp>
+    </p:spTree>
+  </p:cSld>
+  <p:clrMapOvr>
+    <a:masterClrMapping/>
+  </p:clrMapOvr>
+</p:sld>
+</file>
+
+<file path=ppt/slides/slide15.xml><?xml version="1.0" encoding="utf-8"?>
+<p:sld xmlns:a="http://schemas.openxmlformats.org/drawingml/2006/main" xmlns:r="http://schemas.openxmlformats.org/officeDocument/2006/relationships" xmlns:mc="http://schemas.openxmlformats.org/markup-compatibility/2006" xmlns:mv="urn:schemas-microsoft-com:mac:vml" xmlns:p="http://schemas.openxmlformats.org/presentationml/2006/main" xmlns:c="http://schemas.openxmlformats.org/drawingml/2006/chart" xmlns:dgm="http://schemas.openxmlformats.org/drawingml/2006/diagram" xmlns:o="urn:schemas-microsoft-com:office:office" xmlns:v="urn:schemas-microsoft-com:vml" xmlns:pvml="urn:schemas-microsoft-com:office:powerpoint" xmlns:com="http://schemas.openxmlformats.org/drawingml/2006/compatibility" xmlns:p14="http://schemas.microsoft.com/office/powerpoint/2010/main" xmlns:p15="http://schemas.microsoft.com/office/powerpoint/2012/main" xmlns:ahyp="http://schemas.microsoft.com/office/drawing/2018/hyperlinkcolor">
+  <p:cSld>
+    <p:spTree>
+      <p:nvGrpSpPr>
+        <p:cNvPr id="147" name="Shape 147"/>
+        <p:cNvGrpSpPr/>
+        <p:nvPr/>
+      </p:nvGrpSpPr>
+      <p:grpSpPr>
+        <a:xfrm>
+          <a:off x="0" y="0"/>
+          <a:ext cx="0" cy="0"/>
+          <a:chOff x="0" y="0"/>
+          <a:chExt cx="0" cy="0"/>
+        </a:xfrm>
+      </p:grpSpPr>
+      <p:sp>
+        <p:nvSpPr>
+          <p:cNvPr id="148" name="Google Shape;148;p27"/>
+          <p:cNvSpPr txBox="1"/>
+          <p:nvPr>
+            <p:ph type="title"/>
+          </p:nvPr>
+        </p:nvSpPr>
+        <p:spPr>
+          <a:xfrm>
+            <a:off x="471900" y="738725"/>
+            <a:ext cx="8222100" cy="767700"/>
+          </a:xfrm>
+          <a:prstGeom prst="rect">
+            <a:avLst/>
+          </a:prstGeom>
+        </p:spPr>
+        <p:txBody>
+          <a:bodyPr anchorCtr="0" anchor="b" bIns="91425" lIns="91425" spcFirstLastPara="1" rIns="91425" wrap="square" tIns="91425">
+            <a:normAutofit/>
+          </a:bodyPr>
+          <a:lstStyle/>
+          <a:p>
+            <a:pPr indent="0" lvl="0" marL="0" rtl="0" algn="l">
+              <a:spcBef>
+                <a:spcPts val="0"/>
+              </a:spcBef>
+              <a:spcAft>
+                <a:spcPts val="0"/>
+              </a:spcAft>
+              <a:buNone/>
+            </a:pPr>
+            <a:r>
+              <a:rPr lang="pt-BR"/>
+              <a:t>Trabalhos Futuros</a:t>
+            </a:r>
+            <a:endParaRPr/>
+          </a:p>
+        </p:txBody>
+      </p:sp>
+      <p:sp>
+        <p:nvSpPr>
+          <p:cNvPr id="149" name="Google Shape;149;p27"/>
+          <p:cNvSpPr txBox="1"/>
+          <p:nvPr>
+            <p:ph idx="1" type="body"/>
+          </p:nvPr>
+        </p:nvSpPr>
+        <p:spPr>
+          <a:xfrm>
+            <a:off x="471900" y="1919075"/>
+            <a:ext cx="8222100" cy="2710200"/>
+          </a:xfrm>
+          <a:prstGeom prst="rect">
+            <a:avLst/>
+          </a:prstGeom>
+        </p:spPr>
+        <p:txBody>
+          <a:bodyPr anchorCtr="0" anchor="t" bIns="91425" lIns="91425" spcFirstLastPara="1" rIns="91425" wrap="square" tIns="91425">
+            <a:normAutofit/>
+          </a:bodyPr>
+          <a:lstStyle/>
+          <a:p>
+            <a:pPr indent="-342900" lvl="0" marL="457200" rtl="0" algn="just">
+              <a:spcBef>
+                <a:spcPts val="0"/>
+              </a:spcBef>
+              <a:spcAft>
+                <a:spcPts val="0"/>
+              </a:spcAft>
+              <a:buSzPts val="1800"/>
+              <a:buChar char="●"/>
+            </a:pPr>
+            <a:r>
+              <a:rPr lang="pt-BR"/>
+              <a:t>Realizar experimentos com as variações de CAM propostas na Literatura.</a:t>
+            </a:r>
+            <a:endParaRPr/>
+          </a:p>
+          <a:p>
+            <a:pPr indent="-342900" lvl="0" marL="457200" rtl="0" algn="just">
+              <a:spcBef>
+                <a:spcPts val="0"/>
+              </a:spcBef>
+              <a:spcAft>
+                <a:spcPts val="0"/>
+              </a:spcAft>
+              <a:buSzPts val="1800"/>
+              <a:buChar char="●"/>
+            </a:pPr>
+            <a:r>
+              <a:t/>
+            </a:r>
+            <a:endParaRPr/>
+          </a:p>
+        </p:txBody>
+      </p:sp>
+    </p:spTree>
+  </p:cSld>
+  <p:clrMapOvr>
+    <a:masterClrMapping/>
+  </p:clrMapOvr>
+</p:sld>
+</file>
+
+<file path=ppt/slides/slide16.xml><?xml version="1.0" encoding="utf-8"?>
+<p:sld xmlns:a="http://schemas.openxmlformats.org/drawingml/2006/main" xmlns:r="http://schemas.openxmlformats.org/officeDocument/2006/relationships" xmlns:mc="http://schemas.openxmlformats.org/markup-compatibility/2006" xmlns:mv="urn:schemas-microsoft-com:mac:vml" xmlns:p="http://schemas.openxmlformats.org/presentationml/2006/main" xmlns:c="http://schemas.openxmlformats.org/drawingml/2006/chart" xmlns:dgm="http://schemas.openxmlformats.org/drawingml/2006/diagram" xmlns:o="urn:schemas-microsoft-com:office:office" xmlns:v="urn:schemas-microsoft-com:vml" xmlns:pvml="urn:schemas-microsoft-com:office:powerpoint" xmlns:com="http://schemas.openxmlformats.org/drawingml/2006/compatibility" xmlns:p14="http://schemas.microsoft.com/office/powerpoint/2010/main" xmlns:p15="http://schemas.microsoft.com/office/powerpoint/2012/main" xmlns:ahyp="http://schemas.microsoft.com/office/drawing/2018/hyperlinkcolor">
+  <p:cSld>
+    <p:spTree>
+      <p:nvGrpSpPr>
+        <p:cNvPr id="153" name="Shape 153"/>
+        <p:cNvGrpSpPr/>
+        <p:nvPr/>
+      </p:nvGrpSpPr>
+      <p:grpSpPr>
+        <a:xfrm>
+          <a:off x="0" y="0"/>
+          <a:ext cx="0" cy="0"/>
+          <a:chOff x="0" y="0"/>
+          <a:chExt cx="0" cy="0"/>
+        </a:xfrm>
+      </p:grpSpPr>
+      <p:sp>
+        <p:nvSpPr>
+          <p:cNvPr id="154" name="Google Shape;154;p28"/>
+          <p:cNvSpPr txBox="1"/>
+          <p:nvPr>
+            <p:ph type="title"/>
+          </p:nvPr>
+        </p:nvSpPr>
+        <p:spPr>
+          <a:xfrm>
+            <a:off x="471900" y="738725"/>
+            <a:ext cx="8222100" cy="767700"/>
+          </a:xfrm>
+          <a:prstGeom prst="rect">
+            <a:avLst/>
+          </a:prstGeom>
+        </p:spPr>
+        <p:txBody>
+          <a:bodyPr anchorCtr="0" anchor="b" bIns="91425" lIns="91425" spcFirstLastPara="1" rIns="91425" wrap="square" tIns="91425">
+            <a:normAutofit/>
+          </a:bodyPr>
+          <a:lstStyle/>
+          <a:p>
+            <a:pPr indent="0" lvl="0" marL="0" rtl="0" algn="l">
+              <a:spcBef>
+                <a:spcPts val="0"/>
+              </a:spcBef>
+              <a:spcAft>
+                <a:spcPts val="0"/>
+              </a:spcAft>
+              <a:buNone/>
+            </a:pPr>
+            <a:r>
+              <a:rPr lang="pt-BR"/>
+              <a:t>Referências</a:t>
+            </a:r>
+            <a:endParaRPr/>
+          </a:p>
+        </p:txBody>
+      </p:sp>
+      <p:sp>
+        <p:nvSpPr>
+          <p:cNvPr id="155" name="Google Shape;155;p28"/>
+          <p:cNvSpPr txBox="1"/>
+          <p:nvPr>
+            <p:ph idx="1" type="body"/>
+          </p:nvPr>
+        </p:nvSpPr>
+        <p:spPr>
+          <a:xfrm>
+            <a:off x="471900" y="1919075"/>
+            <a:ext cx="8222100" cy="2970900"/>
+          </a:xfrm>
+          <a:prstGeom prst="rect">
+            <a:avLst/>
+          </a:prstGeom>
+        </p:spPr>
+        <p:txBody>
+          <a:bodyPr anchorCtr="0" anchor="t" bIns="91425" lIns="91425" spcFirstLastPara="1" rIns="91425" wrap="square" tIns="91425">
+            <a:normAutofit fontScale="85000" lnSpcReduction="10000"/>
+          </a:bodyPr>
+          <a:lstStyle/>
+          <a:p>
+            <a:pPr indent="-325755" lvl="0" marL="457200" rtl="0" algn="just">
+              <a:lnSpc>
+                <a:spcPct val="115000"/>
+              </a:lnSpc>
+              <a:spcBef>
+                <a:spcPts val="0"/>
+              </a:spcBef>
+              <a:spcAft>
+                <a:spcPts val="0"/>
+              </a:spcAft>
+              <a:buSzPct val="100000"/>
+              <a:buChar char="●"/>
+            </a:pPr>
+            <a:r>
+              <a:rPr lang="pt-BR"/>
+              <a:t>RAS</a:t>
+            </a:r>
+            <a:r>
+              <a:rPr lang="pt-BR"/>
+              <a:t>, G., XIE, N., VAN GERVEN, M., DORAN, D., “</a:t>
+            </a:r>
+            <a:r>
+              <a:rPr b="1" lang="pt-BR"/>
+              <a:t>Explainable Deep Learning</a:t>
+            </a:r>
+            <a:r>
+              <a:rPr lang="pt-BR"/>
+              <a:t>: A Field Guide for the Uninitiated”, In: </a:t>
+            </a:r>
+            <a:r>
+              <a:rPr i="1" lang="pt-BR"/>
+              <a:t>Journal of Artificial Intelligence Research</a:t>
+            </a:r>
+            <a:r>
+              <a:rPr lang="pt-BR"/>
+              <a:t>, v. 73, pp. 329--397, 2022.</a:t>
+            </a:r>
+            <a:endParaRPr/>
+          </a:p>
+          <a:p>
+            <a:pPr indent="-325755" lvl="0" marL="457200" rtl="0" algn="just">
+              <a:lnSpc>
+                <a:spcPct val="115000"/>
+              </a:lnSpc>
+              <a:spcBef>
+                <a:spcPts val="0"/>
+              </a:spcBef>
+              <a:spcAft>
+                <a:spcPts val="0"/>
+              </a:spcAft>
+              <a:buSzPct val="100000"/>
+              <a:buChar char="●"/>
+            </a:pPr>
+            <a:r>
+              <a:rPr lang="pt-BR"/>
+              <a:t>ZEILER, M. D, KRISHNAN, D., TAYLOR, G. W., FERGUS, R., 2010, “Deconvolutional Networks”, In: </a:t>
+            </a:r>
+            <a:r>
+              <a:rPr i="1" lang="pt-BR"/>
+              <a:t>2010 IEEE Computer Society Conference on Computer Vision and Pattern Recognition</a:t>
+            </a:r>
+            <a:r>
+              <a:rPr lang="pt-BR"/>
+              <a:t>. pp. 2528-2535, IEEE, 2010.</a:t>
+            </a:r>
+            <a:endParaRPr/>
+          </a:p>
+          <a:p>
+            <a:pPr indent="-325755" lvl="0" marL="457200" rtl="0" algn="just">
+              <a:spcBef>
+                <a:spcPts val="0"/>
+              </a:spcBef>
+              <a:spcAft>
+                <a:spcPts val="0"/>
+              </a:spcAft>
+              <a:buSzPct val="100000"/>
+              <a:buChar char="●"/>
+            </a:pPr>
+            <a:r>
+              <a:rPr lang="pt-BR"/>
+              <a:t>ZEILER, M. D, FERGUS, R., 2014, “Visualizing and Understanding Convolutional Networks”, In: </a:t>
+            </a:r>
+            <a:r>
+              <a:rPr i="1" lang="pt-BR"/>
+              <a:t>European Conference on Computer Vision</a:t>
+            </a:r>
+            <a:r>
+              <a:rPr lang="pt-BR"/>
+              <a:t>, pp. 818-833, Springer, 2014.</a:t>
+            </a:r>
+            <a:endParaRPr/>
+          </a:p>
+          <a:p>
+            <a:pPr indent="-325755" lvl="0" marL="457200" rtl="0" algn="just">
+              <a:spcBef>
+                <a:spcPts val="0"/>
+              </a:spcBef>
+              <a:spcAft>
+                <a:spcPts val="0"/>
+              </a:spcAft>
+              <a:buSzPct val="100000"/>
+              <a:buChar char="●"/>
+            </a:pPr>
+            <a:r>
+              <a:rPr b="1" lang="pt-BR"/>
+              <a:t>ZHOU, B., KHOSLA, A., LAPEDRIZA, A., OLIVA, A., TORRALBA, A., 2016, “Learning Deep Features for Discriminative Localization”, In: </a:t>
+            </a:r>
+            <a:r>
+              <a:rPr b="1" i="1" lang="pt-BR"/>
+              <a:t>Proceedings of the IEEE Conference on Computer Vision and Pattern Recognition, </a:t>
+            </a:r>
+            <a:r>
+              <a:rPr b="1" lang="pt-BR"/>
+              <a:t>pp. 2921-2929, 2016.</a:t>
+            </a:r>
+            <a:endParaRPr b="1"/>
+          </a:p>
+        </p:txBody>
+      </p:sp>
+    </p:spTree>
+  </p:cSld>
+  <p:clrMapOvr>
+    <a:masterClrMapping/>
+  </p:clrMapOvr>
+</p:sld>
+</file>
+
+<file path=ppt/slides/slide17.xml><?xml version="1.0" encoding="utf-8"?>
+<p:sld xmlns:a="http://schemas.openxmlformats.org/drawingml/2006/main" xmlns:r="http://schemas.openxmlformats.org/officeDocument/2006/relationships" xmlns:mc="http://schemas.openxmlformats.org/markup-compatibility/2006" xmlns:mv="urn:schemas-microsoft-com:mac:vml" xmlns:p="http://schemas.openxmlformats.org/presentationml/2006/main" xmlns:c="http://schemas.openxmlformats.org/drawingml/2006/chart" xmlns:dgm="http://schemas.openxmlformats.org/drawingml/2006/diagram" xmlns:o="urn:schemas-microsoft-com:office:office" xmlns:v="urn:schemas-microsoft-com:vml" xmlns:pvml="urn:schemas-microsoft-com:office:powerpoint" xmlns:com="http://schemas.openxmlformats.org/drawingml/2006/compatibility" xmlns:p14="http://schemas.microsoft.com/office/powerpoint/2010/main" xmlns:p15="http://schemas.microsoft.com/office/powerpoint/2012/main" xmlns:ahyp="http://schemas.microsoft.com/office/drawing/2018/hyperlinkcolor">
+  <p:cSld>
+    <p:spTree>
+      <p:nvGrpSpPr>
+        <p:cNvPr id="159" name="Shape 159"/>
+        <p:cNvGrpSpPr/>
+        <p:nvPr/>
+      </p:nvGrpSpPr>
+      <p:grpSpPr>
+        <a:xfrm>
+          <a:off x="0" y="0"/>
+          <a:ext cx="0" cy="0"/>
+          <a:chOff x="0" y="0"/>
+          <a:chExt cx="0" cy="0"/>
+        </a:xfrm>
+      </p:grpSpPr>
+      <p:sp>
+        <p:nvSpPr>
+          <p:cNvPr id="160" name="Google Shape;160;p29"/>
+          <p:cNvSpPr txBox="1"/>
+          <p:nvPr>
+            <p:ph type="title"/>
+          </p:nvPr>
+        </p:nvSpPr>
+        <p:spPr>
+          <a:xfrm>
+            <a:off x="460950" y="2065350"/>
+            <a:ext cx="8222100" cy="1012800"/>
+          </a:xfrm>
+          <a:prstGeom prst="rect">
+            <a:avLst/>
+          </a:prstGeom>
+        </p:spPr>
+        <p:txBody>
+          <a:bodyPr anchorCtr="0" anchor="ctr" bIns="91425" lIns="91425" spcFirstLastPara="1" rIns="91425" wrap="square" tIns="91425">
+            <a:normAutofit/>
+          </a:bodyPr>
+          <a:lstStyle/>
+          <a:p>
+            <a:pPr indent="0" lvl="0" marL="0" rtl="0" algn="l">
+              <a:spcBef>
+                <a:spcPts val="0"/>
+              </a:spcBef>
+              <a:spcAft>
+                <a:spcPts val="0"/>
+              </a:spcAft>
+              <a:buNone/>
+            </a:pPr>
+            <a:r>
+              <a:rPr lang="pt-BR"/>
+              <a:t>Obrigado</a:t>
             </a:r>
             <a:endParaRPr/>
           </a:p>
@@ -7846,7 +9653,7 @@
             </a:pPr>
             <a:r>
               <a:rPr lang="pt-BR"/>
-              <a:t>Explorar a explicabilidade em modelos de Aprendizagem Profunda baseados em (de)convolução. (*)</a:t>
+              <a:t>Explorar a explicabilidade em modelos de Aprendizagem Profunda baseados em convolução. (*)</a:t>
             </a:r>
             <a:endParaRPr/>
           </a:p>
@@ -7877,7 +9684,7 @@
             </a:pPr>
             <a:r>
               <a:rPr lang="pt-BR" sz="1400"/>
-              <a:t>(*) A escolha de redes baseadas em (de)convoluções se deve ao fato do presente trabalho estar inserido em uma disciplina de Visão Computacional, área do conhecimento que tem utilizado largamente esse tipo de rede neural artificial.</a:t>
+              <a:t>(*) A escolha de redes baseadas em convoluções se deve ao fato do presente trabalho estar inserido em uma disciplina de Visão Computacional, área do conhecimento que tem utilizado largamente esse tipo de rede neural artificial.</a:t>
             </a:r>
             <a:endParaRPr sz="1400"/>
           </a:p>
@@ -7967,11 +9774,11 @@
         </p:spPr>
         <p:txBody>
           <a:bodyPr anchorCtr="0" anchor="t" bIns="91425" lIns="91425" spcFirstLastPara="1" rIns="91425" wrap="square" tIns="91425">
-            <a:normAutofit fontScale="85000" lnSpcReduction="20000"/>
+            <a:normAutofit/>
           </a:bodyPr>
           <a:lstStyle/>
           <a:p>
-            <a:pPr indent="-325755" lvl="0" marL="457200" rtl="0" algn="just">
+            <a:pPr indent="-342900" lvl="0" marL="457200" rtl="0" algn="just">
               <a:lnSpc>
                 <a:spcPct val="150000"/>
               </a:lnSpc>
@@ -7981,120 +9788,12 @@
               <a:spcAft>
                 <a:spcPts val="0"/>
               </a:spcAft>
-              <a:buSzPct val="100000"/>
+              <a:buSzPts val="1800"/>
               <a:buChar char="●"/>
             </a:pPr>
             <a:r>
               <a:rPr lang="pt-BR"/>
               <a:t>“De maneira geral, uma explicação é qualquer informação que ajuda o usuário a entender e a comunicar porque o modelo exibe algum padrão de tomada de decisão e como as decisões individuais ocorrem.”</a:t>
-            </a:r>
-            <a:endParaRPr/>
-          </a:p>
-          <a:p>
-            <a:pPr indent="-325755" lvl="0" marL="457200" rtl="0" algn="just">
-              <a:lnSpc>
-                <a:spcPct val="150000"/>
-              </a:lnSpc>
-              <a:spcBef>
-                <a:spcPts val="0"/>
-              </a:spcBef>
-              <a:spcAft>
-                <a:spcPts val="0"/>
-              </a:spcAft>
-              <a:buSzPct val="100000"/>
-              <a:buChar char="●"/>
-            </a:pPr>
-            <a:r>
-              <a:rPr lang="pt-BR"/>
-              <a:t>Dois objetivos principais:</a:t>
-            </a:r>
-            <a:endParaRPr/>
-          </a:p>
-          <a:p>
-            <a:pPr indent="-304165" lvl="1" marL="914400" rtl="0" algn="just">
-              <a:lnSpc>
-                <a:spcPct val="150000"/>
-              </a:lnSpc>
-              <a:spcBef>
-                <a:spcPts val="0"/>
-              </a:spcBef>
-              <a:spcAft>
-                <a:spcPts val="0"/>
-              </a:spcAft>
-              <a:buSzPct val="100000"/>
-              <a:buChar char="○"/>
-            </a:pPr>
-            <a:r>
-              <a:rPr lang="pt-BR"/>
-              <a:t>“(i) explicações que dão </a:t>
-            </a:r>
-            <a:r>
-              <a:rPr b="1" i="1" lang="pt-BR"/>
-              <a:t>insights </a:t>
-            </a:r>
-            <a:r>
-              <a:rPr b="1" lang="pt-BR"/>
-              <a:t>sobre a generalização e o treinamento do modelo</a:t>
-            </a:r>
-            <a:r>
-              <a:rPr lang="pt-BR"/>
-              <a:t>. [...] dão ao praticante informação adicional que pode ser usada para decisões </a:t>
-            </a:r>
-            <a:r>
-              <a:rPr b="1" lang="pt-BR"/>
-              <a:t>sobre os componentes dos processos de validação e de treinamento do modelo</a:t>
-            </a:r>
-            <a:r>
-              <a:rPr lang="pt-BR"/>
-              <a:t>, por exemplo, a quantidade de dados rotulados, os valores de hiperparâmetros e a escolha de modelo.”</a:t>
-            </a:r>
-            <a:endParaRPr/>
-          </a:p>
-          <a:p>
-            <a:pPr indent="-304165" lvl="1" marL="914400" rtl="0" algn="just">
-              <a:lnSpc>
-                <a:spcPct val="150000"/>
-              </a:lnSpc>
-              <a:spcBef>
-                <a:spcPts val="0"/>
-              </a:spcBef>
-              <a:spcAft>
-                <a:spcPts val="0"/>
-              </a:spcAft>
-              <a:buSzPct val="100000"/>
-              <a:buChar char="○"/>
-            </a:pPr>
-            <a:r>
-              <a:rPr lang="pt-BR"/>
-              <a:t>“(ii) explicações que dão </a:t>
-            </a:r>
-            <a:r>
-              <a:rPr b="1" i="1" lang="pt-BR"/>
-              <a:t>insights </a:t>
-            </a:r>
-            <a:r>
-              <a:rPr b="1" lang="pt-BR"/>
-              <a:t>sobre as predições do modelo</a:t>
-            </a:r>
-            <a:r>
-              <a:rPr lang="pt-BR"/>
-              <a:t>. </a:t>
-            </a:r>
-            <a:r>
-              <a:rPr b="1" lang="pt-BR"/>
-              <a:t>A maior parte das explicações são dessa categoria</a:t>
-            </a:r>
-            <a:r>
-              <a:rPr lang="pt-BR"/>
-              <a:t> e ajudam os praticantes a explicar </a:t>
-            </a:r>
-            <a:r>
-              <a:rPr b="1" lang="pt-BR"/>
-              <a:t>porque o modelo fez uma predição em particular, normalmente em termos das entradas do modelo</a:t>
-            </a:r>
-            <a:r>
-              <a:rPr lang="pt-BR"/>
-              <a:t>.”</a:t>
             </a:r>
             <a:endParaRPr/>
           </a:p>
@@ -8303,7 +10002,7 @@
             </a:pPr>
             <a:r>
               <a:rPr lang="pt-BR"/>
-              <a:t>Próximos Passos</a:t>
+              <a:t>Alguns Benefícios da Visualização</a:t>
             </a:r>
             <a:endParaRPr/>
           </a:p>
@@ -8328,135 +10027,145 @@
         </p:spPr>
         <p:txBody>
           <a:bodyPr anchorCtr="0" anchor="t" bIns="91425" lIns="91425" spcFirstLastPara="1" rIns="91425" wrap="square" tIns="91425">
-            <a:normAutofit/>
+            <a:normAutofit fontScale="92500" lnSpcReduction="10000"/>
           </a:bodyPr>
           <a:lstStyle/>
           <a:p>
-            <a:pPr indent="-342900" lvl="0" marL="457200" rtl="0" algn="just">
-              <a:spcBef>
-                <a:spcPts val="0"/>
-              </a:spcBef>
-              <a:spcAft>
-                <a:spcPts val="0"/>
-              </a:spcAft>
-              <a:buSzPts val="1800"/>
+            <a:pPr indent="-334327" lvl="0" marL="457200" rtl="0" algn="just">
+              <a:spcBef>
+                <a:spcPts val="0"/>
+              </a:spcBef>
+              <a:spcAft>
+                <a:spcPts val="0"/>
+              </a:spcAft>
+              <a:buSzPct val="100000"/>
               <a:buChar char="●"/>
             </a:pPr>
             <a:r>
               <a:rPr lang="pt-BR"/>
-              <a:t>Ler os artigos que separei (artigos do </a:t>
-            </a:r>
-            <a:r>
-              <a:rPr i="1" lang="pt-BR"/>
-              <a:t>slide</a:t>
-            </a:r>
-            <a:r>
-              <a:rPr lang="pt-BR"/>
-              <a:t> Referências).</a:t>
+              <a:t>Verificar quais as áreas da imagem que estão sendo priorizadas pelo modelo.</a:t>
             </a:r>
             <a:endParaRPr/>
           </a:p>
           <a:p>
-            <a:pPr indent="-342900" lvl="0" marL="457200" rtl="0" algn="just">
-              <a:spcBef>
-                <a:spcPts val="0"/>
-              </a:spcBef>
-              <a:spcAft>
-                <a:spcPts val="0"/>
-              </a:spcAft>
-              <a:buSzPts val="1800"/>
+            <a:pPr indent="-334327" lvl="0" marL="457200" rtl="0" algn="just">
+              <a:spcBef>
+                <a:spcPts val="0"/>
+              </a:spcBef>
+              <a:spcAft>
+                <a:spcPts val="0"/>
+              </a:spcAft>
+              <a:buSzPct val="100000"/>
               <a:buChar char="●"/>
             </a:pPr>
             <a:r>
               <a:rPr lang="pt-BR"/>
-              <a:t>Rodar o programa da </a:t>
-            </a:r>
-            <a:r>
-              <a:rPr lang="pt-BR" strike="sngStrike"/>
-              <a:t>DC-UNet</a:t>
-            </a:r>
-            <a:r>
-              <a:rPr lang="pt-BR"/>
-              <a:t> ZFNet (ZEILER e FERGUS, 2014).</a:t>
+              <a:t>Observar se o modelo está dando maior importância às áreas do objeto-alvo ou se está aprendendo áreas do entorno do objeto.</a:t>
             </a:r>
             <a:endParaRPr/>
           </a:p>
           <a:p>
-            <a:pPr indent="-342900" lvl="0" marL="457200" rtl="0" algn="just">
-              <a:spcBef>
-                <a:spcPts val="0"/>
-              </a:spcBef>
-              <a:spcAft>
-                <a:spcPts val="0"/>
-              </a:spcAft>
-              <a:buSzPts val="1800"/>
+            <a:pPr indent="-334327" lvl="0" marL="457200" rtl="0" algn="just">
+              <a:spcBef>
+                <a:spcPts val="0"/>
+              </a:spcBef>
+              <a:spcAft>
+                <a:spcPts val="0"/>
+              </a:spcAft>
+              <a:buSzPct val="100000"/>
               <a:buChar char="●"/>
             </a:pPr>
             <a:r>
               <a:rPr lang="pt-BR"/>
-              <a:t>Pesquisar artigos e técnicas sobre a visualização das saídas das camadas do modelo em função das características de entrada.</a:t>
+              <a:t>Possibilitar um melhor entendimento sobre quais exemplos devem ser utilizados de cada classe.</a:t>
             </a:r>
             <a:endParaRPr/>
           </a:p>
           <a:p>
-            <a:pPr indent="-317500" lvl="1" marL="914400" rtl="0" algn="just">
-              <a:spcBef>
-                <a:spcPts val="0"/>
-              </a:spcBef>
-              <a:spcAft>
-                <a:spcPts val="0"/>
-              </a:spcAft>
-              <a:buSzPts val="1400"/>
+            <a:pPr indent="-334327" lvl="0" marL="457200" rtl="0" algn="just">
+              <a:spcBef>
+                <a:spcPts val="0"/>
+              </a:spcBef>
+              <a:spcAft>
+                <a:spcPts val="0"/>
+              </a:spcAft>
+              <a:buSzPct val="100000"/>
+              <a:buChar char="●"/>
+            </a:pPr>
+            <a:r>
+              <a:rPr lang="pt-BR"/>
+              <a:t>(RAS et al., 2022).</a:t>
+            </a:r>
+            <a:endParaRPr/>
+          </a:p>
+          <a:p>
+            <a:pPr indent="-310832" lvl="1" marL="914400" rtl="0" algn="just">
+              <a:spcBef>
+                <a:spcPts val="0"/>
+              </a:spcBef>
+              <a:spcAft>
+                <a:spcPts val="0"/>
+              </a:spcAft>
+              <a:buSzPct val="100000"/>
               <a:buChar char="○"/>
             </a:pPr>
             <a:r>
               <a:rPr lang="pt-BR"/>
-              <a:t>Por exemplo: </a:t>
+              <a:t>“ganhar </a:t>
             </a:r>
             <a:r>
               <a:rPr i="1" lang="pt-BR"/>
-              <a:t>Deconvolutional networks</a:t>
-            </a:r>
-            <a:endParaRPr i="1"/>
+              <a:t>insight </a:t>
+            </a:r>
+            <a:r>
+              <a:rPr lang="pt-BR"/>
+              <a:t>sobre como a informação é extraída dos dados em diferentes camadas da rede.”</a:t>
+            </a:r>
+            <a:endParaRPr/>
           </a:p>
           <a:p>
-            <a:pPr indent="-317500" lvl="2" marL="1371600" rtl="0" algn="just">
-              <a:spcBef>
-                <a:spcPts val="0"/>
-              </a:spcBef>
-              <a:spcAft>
-                <a:spcPts val="0"/>
-              </a:spcAft>
-              <a:buSzPts val="1400"/>
-              <a:buChar char="■"/>
+            <a:pPr indent="-310832" lvl="1" marL="914400" rtl="0" algn="just">
+              <a:spcBef>
+                <a:spcPts val="0"/>
+              </a:spcBef>
+              <a:spcAft>
+                <a:spcPts val="0"/>
+              </a:spcAft>
+              <a:buSzPct val="100000"/>
+              <a:buChar char="○"/>
             </a:pPr>
             <a:r>
+              <a:rPr i="1" lang="pt-BR"/>
+              <a:t>Insights </a:t>
+            </a:r>
+            <a:r>
               <a:rPr lang="pt-BR"/>
-              <a:t>“Praticantes podem usar esse método para visualizar quanta informação da entrada original as características extraídas mantiveram </a:t>
-            </a:r>
-            <a:r>
-              <a:rPr b="1" lang="pt-BR"/>
-              <a:t>e ganhar </a:t>
-            </a:r>
-            <a:r>
-              <a:rPr b="1" i="1" lang="pt-BR"/>
-              <a:t>insight </a:t>
-            </a:r>
-            <a:r>
-              <a:rPr b="1" lang="pt-BR"/>
-              <a:t>sobre como a informação é extraída dos dados em diferentes camadas da rede.</a:t>
-            </a:r>
+              <a:t>sobre a generalização e o treinamento do modelo.</a:t>
+            </a:r>
+            <a:endParaRPr/>
+          </a:p>
+          <a:p>
+            <a:pPr indent="-310832" lvl="1" marL="914400" rtl="0" algn="just">
+              <a:spcBef>
+                <a:spcPts val="0"/>
+              </a:spcBef>
+              <a:spcAft>
+                <a:spcPts val="0"/>
+              </a:spcAft>
+              <a:buSzPct val="100000"/>
+              <a:buChar char="○"/>
+            </a:pPr>
             <a:r>
               <a:rPr lang="pt-BR"/>
-              <a:t>”  (</a:t>
+              <a:t>Informação</a:t>
             </a:r>
             <a:r>
               <a:rPr lang="pt-BR"/>
-              <a:t>RAS</a:t>
+              <a:t> adicional que ajude a decidir melhor sobre</a:t>
             </a:r>
             <a:r>
               <a:rPr lang="pt-BR"/>
-              <a:t> et al., 2022).</a:t>
+              <a:t>, por exemplo, a quantidade de dados rotulados, os valores de hiperparâmetros e a escolha de modelo.</a:t>
             </a:r>
             <a:endParaRPr/>
           </a:p>
@@ -8521,7 +10230,7 @@
             </a:pPr>
             <a:r>
               <a:rPr lang="pt-BR"/>
-              <a:t>Referências</a:t>
+              <a:t>CAM - Class Activation Mapping </a:t>
             </a:r>
             <a:endParaRPr/>
           </a:p>
@@ -8538,7 +10247,7 @@
         <p:spPr>
           <a:xfrm>
             <a:off x="471900" y="1919075"/>
-            <a:ext cx="8222100" cy="2970900"/>
+            <a:ext cx="8222100" cy="2710200"/>
           </a:xfrm>
           <a:prstGeom prst="rect">
             <a:avLst/>
@@ -8546,240 +10255,78 @@
         </p:spPr>
         <p:txBody>
           <a:bodyPr anchorCtr="0" anchor="t" bIns="91425" lIns="91425" spcFirstLastPara="1" rIns="91425" wrap="square" tIns="91425">
-            <a:normAutofit fontScale="77500" lnSpcReduction="20000"/>
+            <a:normAutofit/>
           </a:bodyPr>
           <a:lstStyle/>
           <a:p>
-            <a:pPr indent="-317182" lvl="0" marL="457200" rtl="0" algn="just">
-              <a:lnSpc>
-                <a:spcPct val="115000"/>
-              </a:lnSpc>
-              <a:spcBef>
-                <a:spcPts val="0"/>
-              </a:spcBef>
-              <a:spcAft>
-                <a:spcPts val="0"/>
-              </a:spcAft>
-              <a:buSzPct val="100000"/>
+            <a:pPr indent="-342900" lvl="0" marL="457200" rtl="0" algn="l">
+              <a:spcBef>
+                <a:spcPts val="0"/>
+              </a:spcBef>
+              <a:spcAft>
+                <a:spcPts val="0"/>
+              </a:spcAft>
+              <a:buSzPts val="1800"/>
               <a:buChar char="●"/>
             </a:pPr>
             <a:r>
               <a:rPr lang="pt-BR"/>
-              <a:t>RAS</a:t>
-            </a:r>
-            <a:r>
-              <a:rPr lang="pt-BR"/>
-              <a:t>, G., XIE, N., VAN GERVEN, M., DORAN, D., “</a:t>
+              <a:t>Global Max Pooling (GMP) e </a:t>
             </a:r>
             <a:r>
               <a:rPr b="1" lang="pt-BR"/>
-              <a:t>Explainable Deep Learning</a:t>
-            </a:r>
-            <a:r>
-              <a:rPr lang="pt-BR"/>
-              <a:t>: A Field Guide for the Uninitiated”, In: </a:t>
-            </a:r>
-            <a:r>
-              <a:rPr i="1" lang="pt-BR"/>
-              <a:t>Journal of Artificial Intelligence Research</a:t>
-            </a:r>
-            <a:r>
-              <a:rPr lang="pt-BR"/>
-              <a:t>, v. 73, pp. 329--397, 2022.</a:t>
+              <a:t>Global Average Pooling (GAP)</a:t>
             </a:r>
             <a:endParaRPr/>
           </a:p>
           <a:p>
-            <a:pPr indent="-317182" lvl="0" marL="457200" rtl="0" algn="just">
-              <a:lnSpc>
-                <a:spcPct val="115000"/>
-              </a:lnSpc>
-              <a:spcBef>
-                <a:spcPts val="0"/>
-              </a:spcBef>
-              <a:spcAft>
-                <a:spcPts val="0"/>
-              </a:spcAft>
-              <a:buSzPct val="100000"/>
+            <a:pPr indent="-342900" lvl="0" marL="457200" rtl="0" algn="l">
+              <a:spcBef>
+                <a:spcPts val="0"/>
+              </a:spcBef>
+              <a:spcAft>
+                <a:spcPts val="0"/>
+              </a:spcAft>
+              <a:buSzPts val="1800"/>
               <a:buChar char="●"/>
             </a:pPr>
             <a:r>
               <a:rPr lang="pt-BR"/>
-              <a:t>ZEILER, M. D, KRISHNAN, D., TAYLOR, G. W., FERGUS, R., 2010, “</a:t>
-            </a:r>
-            <a:r>
-              <a:rPr b="1" lang="pt-BR"/>
-              <a:t>Deconvolutional networks</a:t>
-            </a:r>
-            <a:r>
-              <a:rPr lang="pt-BR"/>
-              <a:t>”, In: </a:t>
-            </a:r>
-            <a:r>
-              <a:rPr i="1" lang="pt-BR"/>
-              <a:t>2010 IEEE Computer Society Conference on Computer Vision and Pattern Recognition</a:t>
-            </a:r>
-            <a:r>
-              <a:rPr lang="pt-BR"/>
-              <a:t>. pp. 2528-2535, IEEE, 2010.</a:t>
+              <a:t>CAM - Class Activation Mapping (ZHOU et al., 2016)</a:t>
             </a:r>
             <a:endParaRPr/>
           </a:p>
           <a:p>
-            <a:pPr indent="-317182" lvl="0" marL="457200" rtl="0" algn="just">
-              <a:spcBef>
-                <a:spcPts val="0"/>
-              </a:spcBef>
-              <a:spcAft>
-                <a:spcPts val="0"/>
-              </a:spcAft>
-              <a:buSzPct val="100000"/>
+            <a:pPr indent="-342900" lvl="0" marL="457200" rtl="0" algn="l">
+              <a:spcBef>
+                <a:spcPts val="0"/>
+              </a:spcBef>
+              <a:spcAft>
+                <a:spcPts val="0"/>
+              </a:spcAft>
+              <a:buSzPts val="1800"/>
               <a:buChar char="●"/>
             </a:pPr>
             <a:r>
-              <a:rPr b="1" lang="pt-BR"/>
-              <a:t>ZEILER, M. D, FERGUS, R., 2014, “Visualizing and Understanding Convolutional Networks”, In: </a:t>
-            </a:r>
-            <a:r>
-              <a:rPr b="1" i="1" lang="pt-BR"/>
-              <a:t>European Conference on Computer Vision</a:t>
-            </a:r>
-            <a:r>
-              <a:rPr b="1" lang="pt-BR"/>
-              <a:t>, pp. 818-833, Springer, 2014.</a:t>
-            </a:r>
-            <a:endParaRPr b="1"/>
-          </a:p>
-          <a:p>
-            <a:pPr indent="-317182" lvl="0" marL="457200" rtl="0" algn="just">
-              <a:lnSpc>
-                <a:spcPct val="115000"/>
-              </a:lnSpc>
-              <a:spcBef>
-                <a:spcPts val="0"/>
-              </a:spcBef>
-              <a:spcAft>
-                <a:spcPts val="0"/>
-              </a:spcAft>
-              <a:buSzPct val="100000"/>
-              <a:buChar char="●"/>
-            </a:pPr>
-            <a:r>
               <a:rPr lang="pt-BR"/>
-              <a:t>RONNEBERGER, O., FISCHER, P., BROX, T., 2015, “</a:t>
-            </a:r>
-            <a:r>
-              <a:rPr b="1" lang="pt-BR"/>
-              <a:t>U-Net</a:t>
-            </a:r>
-            <a:r>
-              <a:rPr lang="pt-BR"/>
-              <a:t>: Convolutional Networks for Biomedical Image Segmentation”, In: </a:t>
-            </a:r>
-            <a:r>
-              <a:rPr i="1" lang="pt-BR"/>
-              <a:t>International Conference on Medical Image Computing and C-Assisted Intervention</a:t>
-            </a:r>
-            <a:r>
-              <a:rPr lang="pt-BR"/>
-              <a:t>, </a:t>
-            </a:r>
-            <a:r>
-              <a:rPr lang="pt-BR"/>
-              <a:t>pp. 234-241, </a:t>
-            </a:r>
-            <a:r>
-              <a:rPr lang="pt-BR"/>
-              <a:t>Springer, Cham, 2015.</a:t>
+              <a:t>Variações</a:t>
             </a:r>
             <a:endParaRPr/>
           </a:p>
           <a:p>
-            <a:pPr indent="-317182" lvl="0" marL="457200" rtl="0" algn="just">
-              <a:lnSpc>
-                <a:spcPct val="115000"/>
-              </a:lnSpc>
-              <a:spcBef>
-                <a:spcPts val="0"/>
-              </a:spcBef>
-              <a:spcAft>
-                <a:spcPts val="0"/>
-              </a:spcAft>
-              <a:buSzPct val="100000"/>
-              <a:buChar char="●"/>
-            </a:pPr>
-            <a:r>
-              <a:rPr lang="pt-BR"/>
-              <a:t>LOU, A., GUAN, S., LOEW, M., </a:t>
-            </a:r>
-            <a:r>
-              <a:rPr lang="pt-BR"/>
-              <a:t>2021,</a:t>
-            </a:r>
-            <a:r>
-              <a:rPr lang="pt-BR"/>
-              <a:t> “</a:t>
-            </a:r>
-            <a:r>
-              <a:rPr b="1" lang="pt-BR"/>
-              <a:t>DC-UNet</a:t>
-            </a:r>
-            <a:r>
-              <a:rPr lang="pt-BR"/>
-              <a:t>: Reth</a:t>
-            </a:r>
-            <a:r>
-              <a:rPr lang="pt-BR"/>
-              <a:t>i</a:t>
-            </a:r>
-            <a:r>
-              <a:rPr lang="pt-BR"/>
-              <a:t>nking the U-Net Architecture with Dual Channel Efficient CNN for Medical Image Segmentation”, In: </a:t>
-            </a:r>
-            <a:r>
-              <a:rPr i="1" lang="pt-BR"/>
-              <a:t>Medical Imaging 2021: Image Processing</a:t>
-            </a:r>
-            <a:r>
-              <a:rPr lang="pt-BR"/>
-              <a:t>, </a:t>
-            </a:r>
-            <a:r>
-              <a:rPr lang="pt-BR"/>
-              <a:t>pp. 758-768, </a:t>
-            </a:r>
-            <a:r>
-              <a:rPr lang="pt-BR"/>
-              <a:t>SPIE, 2021.</a:t>
-            </a:r>
-            <a:endParaRPr/>
-          </a:p>
-          <a:p>
-            <a:pPr indent="-297497" lvl="1" marL="914400" rtl="0" algn="just">
-              <a:lnSpc>
-                <a:spcPct val="115000"/>
-              </a:lnSpc>
-              <a:spcBef>
-                <a:spcPts val="0"/>
-              </a:spcBef>
-              <a:spcAft>
-                <a:spcPts val="0"/>
-              </a:spcAft>
-              <a:buSzPct val="100000"/>
+            <a:pPr indent="-317500" lvl="1" marL="914400" rtl="0" algn="l">
+              <a:spcBef>
+                <a:spcPts val="0"/>
+              </a:spcBef>
+              <a:spcAft>
+                <a:spcPts val="0"/>
+              </a:spcAft>
+              <a:buSzPts val="1400"/>
               <a:buChar char="○"/>
             </a:pPr>
             <a:r>
               <a:rPr lang="pt-BR"/>
-              <a:t>Respositório: </a:t>
-            </a:r>
-            <a:r>
-              <a:rPr lang="pt-BR" u="sng">
-                <a:solidFill>
-                  <a:schemeClr val="hlink"/>
-                </a:solidFill>
-                <a:hlinkClick r:id="rId3"/>
-              </a:rPr>
-              <a:t>https://github.com/AngeLouCN/DC-UNet</a:t>
+              <a:t>Score-CAM e Grad-CAM (alfa)</a:t>
             </a:r>
             <a:endParaRPr/>
           </a:p>
@@ -8820,15 +10367,15 @@
         </p:nvSpPr>
         <p:spPr>
           <a:xfrm>
-            <a:off x="460950" y="2065350"/>
-            <a:ext cx="8222100" cy="1012800"/>
+            <a:off x="471900" y="738725"/>
+            <a:ext cx="8222100" cy="767700"/>
           </a:xfrm>
           <a:prstGeom prst="rect">
             <a:avLst/>
           </a:prstGeom>
         </p:spPr>
         <p:txBody>
-          <a:bodyPr anchorCtr="0" anchor="ctr" bIns="91425" lIns="91425" spcFirstLastPara="1" rIns="91425" wrap="square" tIns="91425">
+          <a:bodyPr anchorCtr="0" anchor="b" bIns="91425" lIns="91425" spcFirstLastPara="1" rIns="91425" wrap="square" tIns="91425">
             <a:normAutofit/>
           </a:bodyPr>
           <a:lstStyle/>
@@ -8844,7 +10391,316 @@
             </a:pPr>
             <a:r>
               <a:rPr lang="pt-BR"/>
-              <a:t>Obrigado</a:t>
+              <a:t>Arquitetura da Rede</a:t>
+            </a:r>
+            <a:endParaRPr/>
+          </a:p>
+        </p:txBody>
+      </p:sp>
+      <p:sp>
+        <p:nvSpPr>
+          <p:cNvPr id="109" name="Google Shape;109;p20"/>
+          <p:cNvSpPr txBox="1"/>
+          <p:nvPr>
+            <p:ph idx="1" type="body"/>
+          </p:nvPr>
+        </p:nvSpPr>
+        <p:spPr>
+          <a:xfrm>
+            <a:off x="471900" y="1919075"/>
+            <a:ext cx="8222100" cy="2710200"/>
+          </a:xfrm>
+          <a:prstGeom prst="rect">
+            <a:avLst/>
+          </a:prstGeom>
+        </p:spPr>
+        <p:txBody>
+          <a:bodyPr anchorCtr="0" anchor="t" bIns="91425" lIns="91425" spcFirstLastPara="1" rIns="91425" wrap="square" tIns="91425">
+            <a:normAutofit/>
+          </a:bodyPr>
+          <a:lstStyle/>
+          <a:p>
+            <a:pPr indent="0" lvl="0" marL="0" rtl="0" algn="l">
+              <a:spcBef>
+                <a:spcPts val="0"/>
+              </a:spcBef>
+              <a:spcAft>
+                <a:spcPts val="1200"/>
+              </a:spcAft>
+              <a:buNone/>
+            </a:pPr>
+            <a:r>
+              <a:t/>
+            </a:r>
+            <a:endParaRPr/>
+          </a:p>
+        </p:txBody>
+      </p:sp>
+    </p:spTree>
+  </p:cSld>
+  <p:clrMapOvr>
+    <a:masterClrMapping/>
+  </p:clrMapOvr>
+</p:sld>
+</file>
+
+<file path=ppt/slides/slide9.xml><?xml version="1.0" encoding="utf-8"?>
+<p:sld xmlns:a="http://schemas.openxmlformats.org/drawingml/2006/main" xmlns:r="http://schemas.openxmlformats.org/officeDocument/2006/relationships" xmlns:mc="http://schemas.openxmlformats.org/markup-compatibility/2006" xmlns:mv="urn:schemas-microsoft-com:mac:vml" xmlns:p="http://schemas.openxmlformats.org/presentationml/2006/main" xmlns:c="http://schemas.openxmlformats.org/drawingml/2006/chart" xmlns:dgm="http://schemas.openxmlformats.org/drawingml/2006/diagram" xmlns:o="urn:schemas-microsoft-com:office:office" xmlns:v="urn:schemas-microsoft-com:vml" xmlns:pvml="urn:schemas-microsoft-com:office:powerpoint" xmlns:com="http://schemas.openxmlformats.org/drawingml/2006/compatibility" xmlns:p14="http://schemas.microsoft.com/office/powerpoint/2010/main" xmlns:p15="http://schemas.microsoft.com/office/powerpoint/2012/main" xmlns:ahyp="http://schemas.microsoft.com/office/drawing/2018/hyperlinkcolor">
+  <p:cSld>
+    <p:spTree>
+      <p:nvGrpSpPr>
+        <p:cNvPr id="113" name="Shape 113"/>
+        <p:cNvGrpSpPr/>
+        <p:nvPr/>
+      </p:nvGrpSpPr>
+      <p:grpSpPr>
+        <a:xfrm>
+          <a:off x="0" y="0"/>
+          <a:ext cx="0" cy="0"/>
+          <a:chOff x="0" y="0"/>
+          <a:chExt cx="0" cy="0"/>
+        </a:xfrm>
+      </p:grpSpPr>
+      <p:sp>
+        <p:nvSpPr>
+          <p:cNvPr id="114" name="Google Shape;114;p21"/>
+          <p:cNvSpPr txBox="1"/>
+          <p:nvPr>
+            <p:ph type="title"/>
+          </p:nvPr>
+        </p:nvSpPr>
+        <p:spPr>
+          <a:xfrm>
+            <a:off x="471900" y="738725"/>
+            <a:ext cx="8222100" cy="767700"/>
+          </a:xfrm>
+          <a:prstGeom prst="rect">
+            <a:avLst/>
+          </a:prstGeom>
+        </p:spPr>
+        <p:txBody>
+          <a:bodyPr anchorCtr="0" anchor="b" bIns="91425" lIns="91425" spcFirstLastPara="1" rIns="91425" wrap="square" tIns="91425">
+            <a:normAutofit/>
+          </a:bodyPr>
+          <a:lstStyle/>
+          <a:p>
+            <a:pPr indent="0" lvl="0" marL="0" rtl="0" algn="l">
+              <a:spcBef>
+                <a:spcPts val="0"/>
+              </a:spcBef>
+              <a:spcAft>
+                <a:spcPts val="0"/>
+              </a:spcAft>
+              <a:buNone/>
+            </a:pPr>
+            <a:r>
+              <a:rPr lang="pt-BR"/>
+              <a:t>Experimentos</a:t>
+            </a:r>
+            <a:endParaRPr/>
+          </a:p>
+        </p:txBody>
+      </p:sp>
+      <p:sp>
+        <p:nvSpPr>
+          <p:cNvPr id="115" name="Google Shape;115;p21"/>
+          <p:cNvSpPr txBox="1"/>
+          <p:nvPr>
+            <p:ph idx="1" type="body"/>
+          </p:nvPr>
+        </p:nvSpPr>
+        <p:spPr>
+          <a:xfrm>
+            <a:off x="471900" y="1919075"/>
+            <a:ext cx="8222100" cy="2710200"/>
+          </a:xfrm>
+          <a:prstGeom prst="rect">
+            <a:avLst/>
+          </a:prstGeom>
+        </p:spPr>
+        <p:txBody>
+          <a:bodyPr anchorCtr="0" anchor="t" bIns="91425" lIns="91425" spcFirstLastPara="1" rIns="91425" wrap="square" tIns="91425">
+            <a:normAutofit/>
+          </a:bodyPr>
+          <a:lstStyle/>
+          <a:p>
+            <a:pPr indent="-342900" lvl="0" marL="457200" rtl="0" algn="l">
+              <a:spcBef>
+                <a:spcPts val="0"/>
+              </a:spcBef>
+              <a:spcAft>
+                <a:spcPts val="0"/>
+              </a:spcAft>
+              <a:buSzPts val="1800"/>
+              <a:buChar char="●"/>
+            </a:pPr>
+            <a:r>
+              <a:rPr i="1" lang="pt-BR"/>
+              <a:t>Kernels Size</a:t>
+            </a:r>
+            <a:r>
+              <a:rPr lang="pt-BR"/>
+              <a:t>: 4, 11, 18</a:t>
+            </a:r>
+            <a:endParaRPr/>
+          </a:p>
+          <a:p>
+            <a:pPr indent="-342900" lvl="0" marL="457200" rtl="0" algn="l">
+              <a:spcBef>
+                <a:spcPts val="0"/>
+              </a:spcBef>
+              <a:spcAft>
+                <a:spcPts val="0"/>
+              </a:spcAft>
+              <a:buSzPts val="1800"/>
+              <a:buChar char="●"/>
+            </a:pPr>
+            <a:r>
+              <a:rPr lang="pt-BR"/>
+              <a:t>Épocas</a:t>
+            </a:r>
+            <a:endParaRPr/>
+          </a:p>
+          <a:p>
+            <a:pPr indent="-317500" lvl="1" marL="914400" rtl="0" algn="l">
+              <a:spcBef>
+                <a:spcPts val="0"/>
+              </a:spcBef>
+              <a:spcAft>
+                <a:spcPts val="0"/>
+              </a:spcAft>
+              <a:buSzPts val="1400"/>
+              <a:buChar char="○"/>
+            </a:pPr>
+            <a:r>
+              <a:rPr lang="pt-BR"/>
+              <a:t>Máximo: 100</a:t>
+            </a:r>
+            <a:endParaRPr/>
+          </a:p>
+          <a:p>
+            <a:pPr indent="-317500" lvl="1" marL="914400" rtl="0" algn="l">
+              <a:spcBef>
+                <a:spcPts val="0"/>
+              </a:spcBef>
+              <a:spcAft>
+                <a:spcPts val="0"/>
+              </a:spcAft>
+              <a:buSzPts val="1400"/>
+              <a:buChar char="○"/>
+            </a:pPr>
+            <a:r>
+              <a:rPr i="1" lang="pt-BR"/>
+              <a:t>E</a:t>
+            </a:r>
+            <a:r>
+              <a:rPr i="1" lang="pt-BR"/>
+              <a:t>arly Stopping</a:t>
+            </a:r>
+            <a:r>
+              <a:rPr lang="pt-BR"/>
+              <a:t> (</a:t>
+            </a:r>
+            <a:r>
+              <a:rPr i="1" lang="pt-BR"/>
+              <a:t>patience </a:t>
+            </a:r>
+            <a:r>
+              <a:rPr lang="pt-BR"/>
+              <a:t>= 20)</a:t>
+            </a:r>
+            <a:endParaRPr/>
+          </a:p>
+          <a:p>
+            <a:pPr indent="-342900" lvl="0" marL="457200" rtl="0" algn="l">
+              <a:spcBef>
+                <a:spcPts val="0"/>
+              </a:spcBef>
+              <a:spcAft>
+                <a:spcPts val="0"/>
+              </a:spcAft>
+              <a:buSzPts val="1800"/>
+              <a:buChar char="●"/>
+            </a:pPr>
+            <a:r>
+              <a:rPr i="1" lang="pt-BR"/>
+              <a:t>Dataset</a:t>
+            </a:r>
+            <a:endParaRPr/>
+          </a:p>
+          <a:p>
+            <a:pPr indent="-317500" lvl="1" marL="914400" rtl="0" algn="l">
+              <a:spcBef>
+                <a:spcPts val="0"/>
+              </a:spcBef>
+              <a:spcAft>
+                <a:spcPts val="0"/>
+              </a:spcAft>
+              <a:buSzPts val="1400"/>
+              <a:buChar char="○"/>
+            </a:pPr>
+            <a:r>
+              <a:rPr lang="pt-BR"/>
+              <a:t>As imagens passaram por um pré-processamento e por </a:t>
+            </a:r>
+            <a:r>
+              <a:rPr i="1" lang="pt-BR"/>
+              <a:t>Data Augmentation</a:t>
+            </a:r>
+            <a:r>
+              <a:rPr lang="pt-BR"/>
+              <a:t>.</a:t>
+            </a:r>
+            <a:endParaRPr/>
+          </a:p>
+          <a:p>
+            <a:pPr indent="-317500" lvl="2" marL="1371600" rtl="0" algn="l">
+              <a:spcBef>
+                <a:spcPts val="0"/>
+              </a:spcBef>
+              <a:spcAft>
+                <a:spcPts val="0"/>
+              </a:spcAft>
+              <a:buSzPts val="1400"/>
+              <a:buChar char="■"/>
+            </a:pPr>
+            <a:r>
+              <a:rPr lang="pt-BR"/>
+              <a:t>Formato: JPEG.</a:t>
+            </a:r>
+            <a:endParaRPr/>
+          </a:p>
+          <a:p>
+            <a:pPr indent="-317500" lvl="2" marL="1371600" rtl="0" algn="l">
+              <a:spcBef>
+                <a:spcPts val="0"/>
+              </a:spcBef>
+              <a:spcAft>
+                <a:spcPts val="0"/>
+              </a:spcAft>
+              <a:buSzPts val="1400"/>
+              <a:buChar char="■"/>
+            </a:pPr>
+            <a:r>
+              <a:rPr lang="pt-BR"/>
+              <a:t>Dimensões: 224 x 224 px</a:t>
+            </a:r>
+            <a:endParaRPr/>
+          </a:p>
+          <a:p>
+            <a:pPr indent="-317500" lvl="2" marL="1371600" rtl="0" algn="l">
+              <a:spcBef>
+                <a:spcPts val="0"/>
+              </a:spcBef>
+              <a:spcAft>
+                <a:spcPts val="0"/>
+              </a:spcAft>
+              <a:buSzPts val="1400"/>
+              <a:buChar char="■"/>
+            </a:pPr>
+            <a:r>
+              <a:rPr lang="pt-BR"/>
+              <a:t>3 canais (RGB)</a:t>
             </a:r>
             <a:endParaRPr/>
           </a:p>

</xml_diff>